<commit_message>
Added self-introduce to presentation
</commit_message>
<xml_diff>
--- a/Finalpresentaion.pptx
+++ b/Finalpresentaion.pptx
@@ -8,17 +8,19 @@
     <p:sldId id="256" r:id="rId2"/>
     <p:sldId id="258" r:id="rId3"/>
     <p:sldId id="259" r:id="rId4"/>
-    <p:sldId id="260" r:id="rId5"/>
-    <p:sldId id="261" r:id="rId6"/>
-    <p:sldId id="294" r:id="rId7"/>
-    <p:sldId id="262" r:id="rId8"/>
-    <p:sldId id="295" r:id="rId9"/>
-    <p:sldId id="296" r:id="rId10"/>
-    <p:sldId id="297" r:id="rId11"/>
-    <p:sldId id="264" r:id="rId12"/>
-    <p:sldId id="263" r:id="rId13"/>
-    <p:sldId id="292" r:id="rId14"/>
-    <p:sldId id="293" r:id="rId15"/>
+    <p:sldId id="298" r:id="rId5"/>
+    <p:sldId id="299" r:id="rId6"/>
+    <p:sldId id="260" r:id="rId7"/>
+    <p:sldId id="261" r:id="rId8"/>
+    <p:sldId id="294" r:id="rId9"/>
+    <p:sldId id="262" r:id="rId10"/>
+    <p:sldId id="295" r:id="rId11"/>
+    <p:sldId id="296" r:id="rId12"/>
+    <p:sldId id="297" r:id="rId13"/>
+    <p:sldId id="264" r:id="rId14"/>
+    <p:sldId id="263" r:id="rId15"/>
+    <p:sldId id="292" r:id="rId16"/>
+    <p:sldId id="293" r:id="rId17"/>
   </p:sldIdLst>
   <p:sldSz cx="9144000" cy="5143500" type="screen16x9"/>
   <p:notesSz cx="9144000" cy="5143500"/>
@@ -185,7 +187,7 @@
           <a:p>
             <a:fld id="{1D8BD707-D9CF-40AE-B4C6-C98DA3205C09}" type="datetimeFigureOut">
               <a:rPr lang="en-US"/>
-              <a:t>7/10/22</a:t>
+              <a:t>7/13/22</a:t>
             </a:fld>
             <a:endParaRPr lang="en-US"/>
           </a:p>
@@ -368,7 +370,7 @@
           <a:p>
             <a:fld id="{1D8BD707-D9CF-40AE-B4C6-C98DA3205C09}" type="datetimeFigureOut">
               <a:rPr lang="en-US"/>
-              <a:t>7/10/22</a:t>
+              <a:t>7/13/22</a:t>
             </a:fld>
             <a:endParaRPr lang="en-US"/>
           </a:p>
@@ -600,7 +602,7 @@
           <a:p>
             <a:fld id="{1D8BD707-D9CF-40AE-B4C6-C98DA3205C09}" type="datetimeFigureOut">
               <a:rPr lang="en-US"/>
-              <a:t>7/10/22</a:t>
+              <a:t>7/13/22</a:t>
             </a:fld>
             <a:endParaRPr lang="en-US"/>
           </a:p>
@@ -754,7 +756,7 @@
           <a:p>
             <a:fld id="{1D8BD707-D9CF-40AE-B4C6-C98DA3205C09}" type="datetimeFigureOut">
               <a:rPr lang="en-US"/>
-              <a:t>7/10/22</a:t>
+              <a:t>7/13/22</a:t>
             </a:fld>
             <a:endParaRPr lang="en-US"/>
           </a:p>
@@ -879,7 +881,7 @@
           <a:p>
             <a:fld id="{1D8BD707-D9CF-40AE-B4C6-C98DA3205C09}" type="datetimeFigureOut">
               <a:rPr lang="en-US"/>
-              <a:t>7/10/22</a:t>
+              <a:t>7/13/22</a:t>
             </a:fld>
             <a:endParaRPr lang="en-US"/>
           </a:p>
@@ -1310,7 +1312,7 @@
           <a:p>
             <a:fld id="{1D8BD707-D9CF-40AE-B4C6-C98DA3205C09}" type="datetimeFigureOut">
               <a:rPr lang="en-US"/>
-              <a:t>7/10/22</a:t>
+              <a:t>7/13/22</a:t>
             </a:fld>
             <a:endParaRPr lang="en-US"/>
           </a:p>
@@ -2611,7 +2613,7 @@
                 <a:latin typeface="Calibri"/>
                 <a:cs typeface="Calibri"/>
               </a:rPr>
-              <a:t>PIPELINE</a:t>
+              <a:t>APPLICATION</a:t>
             </a:r>
           </a:p>
           <a:p>
@@ -2633,7 +2635,7 @@
     </p:spTree>
     <p:extLst>
       <p:ext uri="{BB962C8B-B14F-4D97-AF65-F5344CB8AC3E}">
-        <p14:creationId xmlns:p14="http://schemas.microsoft.com/office/powerpoint/2010/main" val="348008039"/>
+        <p14:creationId xmlns:p14="http://schemas.microsoft.com/office/powerpoint/2010/main" val="3583858188"/>
       </p:ext>
     </p:extLst>
   </p:cSld>
@@ -2662,6 +2664,485 @@
       </p:grpSpPr>
       <p:sp>
         <p:nvSpPr>
+          <p:cNvPr id="3" name="object 3"/>
+          <p:cNvSpPr txBox="1">
+            <a:spLocks noGrp="1"/>
+          </p:cNvSpPr>
+          <p:nvPr>
+            <p:ph type="title"/>
+          </p:nvPr>
+        </p:nvSpPr>
+        <p:spPr>
+          <a:prstGeom prst="rect">
+            <a:avLst/>
+          </a:prstGeom>
+        </p:spPr>
+        <p:txBody>
+          <a:bodyPr vert="horz" wrap="square" lIns="0" tIns="13335" rIns="0" bIns="0" rtlCol="0">
+            <a:spAutoFit/>
+          </a:bodyPr>
+          <a:lstStyle/>
+          <a:p>
+            <a:pPr marL="12700">
+              <a:lnSpc>
+                <a:spcPct val="100000"/>
+              </a:lnSpc>
+              <a:spcBef>
+                <a:spcPts val="105"/>
+              </a:spcBef>
+            </a:pPr>
+            <a:r>
+              <a:rPr lang="en-US" spc="55" dirty="0"/>
+              <a:t>Maven-based web-application</a:t>
+            </a:r>
+            <a:endParaRPr spc="55" dirty="0"/>
+          </a:p>
+        </p:txBody>
+      </p:sp>
+      <p:sp>
+        <p:nvSpPr>
+          <p:cNvPr id="4" name="object 4"/>
+          <p:cNvSpPr txBox="1">
+            <a:spLocks noGrp="1"/>
+          </p:cNvSpPr>
+          <p:nvPr>
+            <p:ph type="sldNum" sz="quarter" idx="7"/>
+          </p:nvPr>
+        </p:nvSpPr>
+        <p:spPr>
+          <a:prstGeom prst="rect">
+            <a:avLst/>
+          </a:prstGeom>
+        </p:spPr>
+        <p:txBody>
+          <a:bodyPr vert="horz" wrap="square" lIns="0" tIns="0" rIns="0" bIns="0" rtlCol="0">
+            <a:spAutoFit/>
+          </a:bodyPr>
+          <a:lstStyle/>
+          <a:p>
+            <a:pPr marL="127635">
+              <a:lnSpc>
+                <a:spcPts val="1435"/>
+              </a:lnSpc>
+            </a:pPr>
+            <a:fld id="{81D60167-4931-47E6-BA6A-407CBD079E47}" type="slidenum">
+              <a:rPr dirty="0"/>
+              <a:t>11</a:t>
+            </a:fld>
+            <a:endParaRPr dirty="0"/>
+          </a:p>
+        </p:txBody>
+      </p:sp>
+      <p:pic>
+        <p:nvPicPr>
+          <p:cNvPr id="6" name="Рисунок 5" descr="Изображение выглядит как текст&#10;&#10;Автоматически созданное описание">
+            <a:extLst>
+              <a:ext uri="{FF2B5EF4-FFF2-40B4-BE49-F238E27FC236}">
+                <a16:creationId xmlns:a16="http://schemas.microsoft.com/office/drawing/2014/main" id="{C7DCE911-7FCD-51A7-C03A-DAB73D96664F}"/>
+              </a:ext>
+            </a:extLst>
+          </p:cNvPr>
+          <p:cNvPicPr>
+            <a:picLocks noChangeAspect="1"/>
+          </p:cNvPicPr>
+          <p:nvPr/>
+        </p:nvPicPr>
+        <p:blipFill>
+          <a:blip r:embed="rId2">
+            <a:extLst>
+              <a:ext uri="{28A0092B-C50C-407E-A947-70E740481C1C}">
+                <a14:useLocalDpi xmlns:a14="http://schemas.microsoft.com/office/drawing/2010/main" val="0"/>
+              </a:ext>
+            </a:extLst>
+          </a:blip>
+          <a:stretch>
+            <a:fillRect/>
+          </a:stretch>
+        </p:blipFill>
+        <p:spPr>
+          <a:xfrm>
+            <a:off x="508000" y="749300"/>
+            <a:ext cx="8128000" cy="3644900"/>
+          </a:xfrm>
+          <a:prstGeom prst="rect">
+            <a:avLst/>
+          </a:prstGeom>
+        </p:spPr>
+      </p:pic>
+    </p:spTree>
+    <p:extLst>
+      <p:ext uri="{BB962C8B-B14F-4D97-AF65-F5344CB8AC3E}">
+        <p14:creationId xmlns:p14="http://schemas.microsoft.com/office/powerpoint/2010/main" val="3662531361"/>
+      </p:ext>
+    </p:extLst>
+  </p:cSld>
+  <p:clrMapOvr>
+    <a:masterClrMapping/>
+  </p:clrMapOvr>
+</p:sld>
+</file>
+
+<file path=ppt/slides/slide12.xml><?xml version="1.0" encoding="utf-8"?>
+<p:sld xmlns:a="http://schemas.openxmlformats.org/drawingml/2006/main" xmlns:r="http://schemas.openxmlformats.org/officeDocument/2006/relationships" xmlns:p="http://schemas.openxmlformats.org/presentationml/2006/main" showMasterSp="0">
+  <p:cSld>
+    <p:spTree>
+      <p:nvGrpSpPr>
+        <p:cNvPr id="1" name=""/>
+        <p:cNvGrpSpPr/>
+        <p:nvPr/>
+      </p:nvGrpSpPr>
+      <p:grpSpPr>
+        <a:xfrm>
+          <a:off x="0" y="0"/>
+          <a:ext cx="0" cy="0"/>
+          <a:chOff x="0" y="0"/>
+          <a:chExt cx="0" cy="0"/>
+        </a:xfrm>
+      </p:grpSpPr>
+      <p:sp>
+        <p:nvSpPr>
+          <p:cNvPr id="2" name="object 2"/>
+          <p:cNvSpPr/>
+          <p:nvPr/>
+        </p:nvSpPr>
+        <p:spPr>
+          <a:xfrm>
+            <a:off x="0" y="0"/>
+            <a:ext cx="9144000" cy="4826635"/>
+          </a:xfrm>
+          <a:custGeom>
+            <a:avLst/>
+            <a:gdLst/>
+            <a:ahLst/>
+            <a:cxnLst/>
+            <a:rect l="l" t="t" r="r" b="b"/>
+            <a:pathLst>
+              <a:path w="9144000" h="4826635">
+                <a:moveTo>
+                  <a:pt x="0" y="4826508"/>
+                </a:moveTo>
+                <a:lnTo>
+                  <a:pt x="9144000" y="4826508"/>
+                </a:lnTo>
+                <a:lnTo>
+                  <a:pt x="9144000" y="0"/>
+                </a:lnTo>
+                <a:lnTo>
+                  <a:pt x="0" y="0"/>
+                </a:lnTo>
+                <a:lnTo>
+                  <a:pt x="0" y="4826508"/>
+                </a:lnTo>
+                <a:close/>
+              </a:path>
+            </a:pathLst>
+          </a:custGeom>
+          <a:solidFill>
+            <a:srgbClr val="76CDD7"/>
+          </a:solidFill>
+        </p:spPr>
+        <p:txBody>
+          <a:bodyPr wrap="square" lIns="0" tIns="0" rIns="0" bIns="0" rtlCol="0"/>
+          <a:lstStyle/>
+          <a:p>
+            <a:endParaRPr/>
+          </a:p>
+        </p:txBody>
+      </p:sp>
+      <p:grpSp>
+        <p:nvGrpSpPr>
+          <p:cNvPr id="3" name="object 3"/>
+          <p:cNvGrpSpPr/>
+          <p:nvPr/>
+        </p:nvGrpSpPr>
+        <p:grpSpPr>
+          <a:xfrm>
+            <a:off x="0" y="4826507"/>
+            <a:ext cx="9144000" cy="317500"/>
+            <a:chOff x="0" y="4826507"/>
+            <a:chExt cx="9144000" cy="317500"/>
+          </a:xfrm>
+        </p:grpSpPr>
+        <p:sp>
+          <p:nvSpPr>
+            <p:cNvPr id="4" name="object 4"/>
+            <p:cNvSpPr/>
+            <p:nvPr/>
+          </p:nvSpPr>
+          <p:spPr>
+            <a:xfrm>
+              <a:off x="0" y="4826507"/>
+              <a:ext cx="9144000" cy="317500"/>
+            </a:xfrm>
+            <a:custGeom>
+              <a:avLst/>
+              <a:gdLst/>
+              <a:ahLst/>
+              <a:cxnLst/>
+              <a:rect l="l" t="t" r="r" b="b"/>
+              <a:pathLst>
+                <a:path w="9144000" h="317500">
+                  <a:moveTo>
+                    <a:pt x="9144000" y="0"/>
+                  </a:moveTo>
+                  <a:lnTo>
+                    <a:pt x="0" y="0"/>
+                  </a:lnTo>
+                  <a:lnTo>
+                    <a:pt x="0" y="316991"/>
+                  </a:lnTo>
+                  <a:lnTo>
+                    <a:pt x="9144000" y="316991"/>
+                  </a:lnTo>
+                  <a:lnTo>
+                    <a:pt x="9144000" y="0"/>
+                  </a:lnTo>
+                  <a:close/>
+                </a:path>
+              </a:pathLst>
+            </a:custGeom>
+            <a:solidFill>
+              <a:srgbClr val="090909"/>
+            </a:solidFill>
+          </p:spPr>
+          <p:txBody>
+            <a:bodyPr wrap="square" lIns="0" tIns="0" rIns="0" bIns="0" rtlCol="0"/>
+            <a:lstStyle/>
+            <a:p>
+              <a:endParaRPr/>
+            </a:p>
+          </p:txBody>
+        </p:sp>
+        <p:pic>
+          <p:nvPicPr>
+            <p:cNvPr id="5" name="object 5"/>
+            <p:cNvPicPr/>
+            <p:nvPr/>
+          </p:nvPicPr>
+          <p:blipFill>
+            <a:blip r:embed="rId2" cstate="print"/>
+            <a:stretch>
+              <a:fillRect/>
+            </a:stretch>
+          </p:blipFill>
+          <p:spPr>
+            <a:xfrm>
+              <a:off x="430161" y="4912565"/>
+              <a:ext cx="329643" cy="166940"/>
+            </a:xfrm>
+            <a:prstGeom prst="rect">
+              <a:avLst/>
+            </a:prstGeom>
+          </p:spPr>
+        </p:pic>
+        <p:sp>
+          <p:nvSpPr>
+            <p:cNvPr id="6" name="object 6"/>
+            <p:cNvSpPr/>
+            <p:nvPr/>
+          </p:nvSpPr>
+          <p:spPr>
+            <a:xfrm>
+              <a:off x="359651" y="4926063"/>
+              <a:ext cx="470534" cy="107950"/>
+            </a:xfrm>
+            <a:custGeom>
+              <a:avLst/>
+              <a:gdLst/>
+              <a:ahLst/>
+              <a:cxnLst/>
+              <a:rect l="l" t="t" r="r" b="b"/>
+              <a:pathLst>
+                <a:path w="470534" h="107950">
+                  <a:moveTo>
+                    <a:pt x="46951" y="0"/>
+                  </a:moveTo>
+                  <a:lnTo>
+                    <a:pt x="0" y="45186"/>
+                  </a:lnTo>
+                  <a:lnTo>
+                    <a:pt x="0" y="62941"/>
+                  </a:lnTo>
+                  <a:lnTo>
+                    <a:pt x="46951" y="107416"/>
+                  </a:lnTo>
+                  <a:lnTo>
+                    <a:pt x="46951" y="82842"/>
+                  </a:lnTo>
+                  <a:lnTo>
+                    <a:pt x="16217" y="53708"/>
+                  </a:lnTo>
+                  <a:lnTo>
+                    <a:pt x="46951" y="24155"/>
+                  </a:lnTo>
+                  <a:lnTo>
+                    <a:pt x="46951" y="0"/>
+                  </a:lnTo>
+                  <a:close/>
+                </a:path>
+                <a:path w="470534" h="107950">
+                  <a:moveTo>
+                    <a:pt x="470496" y="45186"/>
+                  </a:moveTo>
+                  <a:lnTo>
+                    <a:pt x="423418" y="0"/>
+                  </a:lnTo>
+                  <a:lnTo>
+                    <a:pt x="423418" y="24155"/>
+                  </a:lnTo>
+                  <a:lnTo>
+                    <a:pt x="454291" y="53708"/>
+                  </a:lnTo>
+                  <a:lnTo>
+                    <a:pt x="423418" y="82842"/>
+                  </a:lnTo>
+                  <a:lnTo>
+                    <a:pt x="423418" y="107416"/>
+                  </a:lnTo>
+                  <a:lnTo>
+                    <a:pt x="470496" y="62941"/>
+                  </a:lnTo>
+                  <a:lnTo>
+                    <a:pt x="470496" y="45186"/>
+                  </a:lnTo>
+                  <a:close/>
+                </a:path>
+              </a:pathLst>
+            </a:custGeom>
+            <a:solidFill>
+              <a:srgbClr val="58C7D6"/>
+            </a:solidFill>
+          </p:spPr>
+          <p:txBody>
+            <a:bodyPr wrap="square" lIns="0" tIns="0" rIns="0" bIns="0" rtlCol="0"/>
+            <a:lstStyle/>
+            <a:p>
+              <a:endParaRPr/>
+            </a:p>
+          </p:txBody>
+        </p:sp>
+      </p:grpSp>
+      <p:sp>
+        <p:nvSpPr>
+          <p:cNvPr id="7" name="object 7"/>
+          <p:cNvSpPr txBox="1"/>
+          <p:nvPr/>
+        </p:nvSpPr>
+        <p:spPr>
+          <a:xfrm>
+            <a:off x="1781555" y="1802892"/>
+            <a:ext cx="5581015" cy="1115690"/>
+          </a:xfrm>
+          <a:prstGeom prst="rect">
+            <a:avLst/>
+          </a:prstGeom>
+          <a:solidFill>
+            <a:srgbClr val="76CDD7"/>
+          </a:solidFill>
+          <a:ln w="6350">
+            <a:solidFill>
+              <a:srgbClr val="FFFFFF"/>
+            </a:solidFill>
+          </a:ln>
+        </p:spPr>
+        <p:txBody>
+          <a:bodyPr vert="horz" wrap="square" lIns="0" tIns="0" rIns="0" bIns="0" rtlCol="0">
+            <a:spAutoFit/>
+          </a:bodyPr>
+          <a:lstStyle/>
+          <a:p>
+            <a:pPr>
+              <a:lnSpc>
+                <a:spcPct val="100000"/>
+              </a:lnSpc>
+            </a:pPr>
+            <a:endParaRPr sz="1600" dirty="0">
+              <a:latin typeface="Times New Roman"/>
+              <a:cs typeface="Times New Roman"/>
+            </a:endParaRPr>
+          </a:p>
+          <a:p>
+            <a:pPr>
+              <a:lnSpc>
+                <a:spcPct val="100000"/>
+              </a:lnSpc>
+              <a:spcBef>
+                <a:spcPts val="10"/>
+              </a:spcBef>
+            </a:pPr>
+            <a:endParaRPr sz="1650" dirty="0">
+              <a:latin typeface="Times New Roman"/>
+              <a:cs typeface="Times New Roman"/>
+            </a:endParaRPr>
+          </a:p>
+          <a:p>
+            <a:pPr marR="20955" algn="ctr">
+              <a:lnSpc>
+                <a:spcPct val="150000"/>
+              </a:lnSpc>
+              <a:spcBef>
+                <a:spcPts val="5"/>
+              </a:spcBef>
+            </a:pPr>
+            <a:r>
+              <a:rPr lang="en-US" sz="1600" b="1" spc="-150" dirty="0">
+                <a:solidFill>
+                  <a:srgbClr val="FFFFFF"/>
+                </a:solidFill>
+                <a:latin typeface="Calibri"/>
+                <a:cs typeface="Calibri"/>
+              </a:rPr>
+              <a:t>PIPELINE</a:t>
+            </a:r>
+          </a:p>
+          <a:p>
+            <a:pPr marR="20955" algn="ctr">
+              <a:lnSpc>
+                <a:spcPct val="100000"/>
+              </a:lnSpc>
+              <a:spcBef>
+                <a:spcPts val="5"/>
+              </a:spcBef>
+            </a:pPr>
+            <a:endParaRPr sz="1600" dirty="0">
+              <a:latin typeface="Calibri"/>
+              <a:cs typeface="Calibri"/>
+            </a:endParaRPr>
+          </a:p>
+        </p:txBody>
+      </p:sp>
+    </p:spTree>
+    <p:extLst>
+      <p:ext uri="{BB962C8B-B14F-4D97-AF65-F5344CB8AC3E}">
+        <p14:creationId xmlns:p14="http://schemas.microsoft.com/office/powerpoint/2010/main" val="348008039"/>
+      </p:ext>
+    </p:extLst>
+  </p:cSld>
+  <p:clrMapOvr>
+    <a:masterClrMapping/>
+  </p:clrMapOvr>
+</p:sld>
+</file>
+
+<file path=ppt/slides/slide13.xml><?xml version="1.0" encoding="utf-8"?>
+<p:sld xmlns:a="http://schemas.openxmlformats.org/drawingml/2006/main" xmlns:r="http://schemas.openxmlformats.org/officeDocument/2006/relationships" xmlns:p="http://schemas.openxmlformats.org/presentationml/2006/main">
+  <p:cSld>
+    <p:spTree>
+      <p:nvGrpSpPr>
+        <p:cNvPr id="1" name=""/>
+        <p:cNvGrpSpPr/>
+        <p:nvPr/>
+      </p:nvGrpSpPr>
+      <p:grpSpPr>
+        <a:xfrm>
+          <a:off x="0" y="0"/>
+          <a:ext cx="0" cy="0"/>
+          <a:chOff x="0" y="0"/>
+          <a:chExt cx="0" cy="0"/>
+        </a:xfrm>
+      </p:grpSpPr>
+      <p:sp>
+        <p:nvSpPr>
           <p:cNvPr id="2" name="object 2"/>
           <p:cNvSpPr txBox="1">
             <a:spLocks noGrp="1"/>
@@ -2725,7 +3206,7 @@
             </a:pPr>
             <a:fld id="{81D60167-4931-47E6-BA6A-407CBD079E47}" type="slidenum">
               <a:rPr spc="-25" dirty="0"/>
-              <a:t>11</a:t>
+              <a:t>13</a:t>
             </a:fld>
             <a:endParaRPr spc="-25" dirty="0"/>
           </a:p>
@@ -2775,7 +3256,7 @@
 </p:sld>
 </file>
 
-<file path=ppt/slides/slide12.xml><?xml version="1.0" encoding="utf-8"?>
+<file path=ppt/slides/slide14.xml><?xml version="1.0" encoding="utf-8"?>
 <p:sld xmlns:a="http://schemas.openxmlformats.org/drawingml/2006/main" xmlns:r="http://schemas.openxmlformats.org/officeDocument/2006/relationships" xmlns:p="http://schemas.openxmlformats.org/presentationml/2006/main">
   <p:cSld>
     <p:spTree>
@@ -3307,7 +3788,7 @@
 </p:sld>
 </file>
 
-<file path=ppt/slides/slide13.xml><?xml version="1.0" encoding="utf-8"?>
+<file path=ppt/slides/slide15.xml><?xml version="1.0" encoding="utf-8"?>
 <p:sld xmlns:a="http://schemas.openxmlformats.org/drawingml/2006/main" xmlns:r="http://schemas.openxmlformats.org/officeDocument/2006/relationships" xmlns:p="http://schemas.openxmlformats.org/presentationml/2006/main" showMasterSp="0">
   <p:cSld>
     <p:spTree>
@@ -3674,7 +4155,7 @@
 </p:sld>
 </file>
 
-<file path=ppt/slides/slide14.xml><?xml version="1.0" encoding="utf-8"?>
+<file path=ppt/slides/slide16.xml><?xml version="1.0" encoding="utf-8"?>
 <p:sld xmlns:a="http://schemas.openxmlformats.org/drawingml/2006/main" xmlns:r="http://schemas.openxmlformats.org/officeDocument/2006/relationships" xmlns:p="http://schemas.openxmlformats.org/presentationml/2006/main" showMasterSp="0">
   <p:cSld>
     <p:spTree>
@@ -4101,7 +4582,7 @@
                 <a:latin typeface="Calibri"/>
                 <a:cs typeface="Calibri"/>
               </a:rPr>
-              <a:t>INIITIALIZE ENVIRONMENT</a:t>
+              <a:t>COUPLE WORDS ABOUT ME</a:t>
             </a:r>
           </a:p>
           <a:p>
@@ -4176,7 +4657,7 @@
             </a:pPr>
             <a:r>
               <a:rPr lang="en-US" spc="65" dirty="0"/>
-              <a:t>What we are using:</a:t>
+              <a:t>Self-introduce</a:t>
             </a:r>
             <a:endParaRPr spc="55" dirty="0"/>
           </a:p>
@@ -4218,10 +4699,10 @@
       </p:sp>
       <p:pic>
         <p:nvPicPr>
-          <p:cNvPr id="15" name="Рисунок 14" descr="Изображение выглядит как текст&#10;&#10;Автоматически созданное описание">
+          <p:cNvPr id="4" name="Рисунок 3" descr="Изображение выглядит как человек, мужчина, костюм, носит&#10;&#10;Автоматически созданное описание">
             <a:extLst>
               <a:ext uri="{FF2B5EF4-FFF2-40B4-BE49-F238E27FC236}">
-                <a16:creationId xmlns:a16="http://schemas.microsoft.com/office/drawing/2014/main" id="{FFC9045A-F79A-1A7F-1E6F-0D30CDFD5412}"/>
+                <a16:creationId xmlns:a16="http://schemas.microsoft.com/office/drawing/2014/main" id="{2112EF97-5788-FAD0-3445-77B15272F04B}"/>
               </a:ext>
             </a:extLst>
           </p:cNvPr>
@@ -4244,14 +4725,94 @@
         </p:blipFill>
         <p:spPr>
           <a:xfrm>
-            <a:off x="1600200" y="742950"/>
-            <a:ext cx="5475055" cy="4035115"/>
+            <a:off x="228600" y="742950"/>
+            <a:ext cx="4123492" cy="3733800"/>
           </a:xfrm>
           <a:prstGeom prst="rect">
             <a:avLst/>
           </a:prstGeom>
         </p:spPr>
       </p:pic>
+      <p:sp>
+        <p:nvSpPr>
+          <p:cNvPr id="5" name="TextBox 4">
+            <a:extLst>
+              <a:ext uri="{FF2B5EF4-FFF2-40B4-BE49-F238E27FC236}">
+                <a16:creationId xmlns:a16="http://schemas.microsoft.com/office/drawing/2014/main" id="{483302B9-8BE8-63B1-6843-54A07A6DF3B0}"/>
+              </a:ext>
+            </a:extLst>
+          </p:cNvPr>
+          <p:cNvSpPr txBox="1"/>
+          <p:nvPr/>
+        </p:nvSpPr>
+        <p:spPr>
+          <a:xfrm>
+            <a:off x="4367332" y="742950"/>
+            <a:ext cx="4700468" cy="3693319"/>
+          </a:xfrm>
+          <a:prstGeom prst="rect">
+            <a:avLst/>
+          </a:prstGeom>
+          <a:noFill/>
+        </p:spPr>
+        <p:txBody>
+          <a:bodyPr wrap="square" rtlCol="0">
+            <a:spAutoFit/>
+          </a:bodyPr>
+          <a:lstStyle/>
+          <a:p>
+            <a:r>
+              <a:rPr lang="en-US" dirty="0"/>
+              <a:t>I’ve being worked at IT from last century.</a:t>
+            </a:r>
+          </a:p>
+          <a:p>
+            <a:r>
+              <a:rPr lang="en-US" dirty="0"/>
+              <a:t>My IT way was began at the </a:t>
+            </a:r>
+            <a:r>
+              <a:rPr lang="en-US" dirty="0" err="1"/>
+              <a:t>Alkar</a:t>
+            </a:r>
+            <a:r>
+              <a:rPr lang="en-US" dirty="0"/>
+              <a:t>-Teleport. The name of company was changed some times but my chair wasn’t changed. I’d worked at the </a:t>
+            </a:r>
+            <a:r>
+              <a:rPr lang="en-US" dirty="0" err="1"/>
+              <a:t>Alkar</a:t>
+            </a:r>
+            <a:r>
+              <a:rPr lang="en-US" dirty="0"/>
+              <a:t>-Optima-Vega Telecom about 11 years.</a:t>
+            </a:r>
+          </a:p>
+          <a:p>
+            <a:r>
+              <a:rPr lang="en-US" dirty="0"/>
+              <a:t>Next 11 years I’ve worked at the PrivatBank. </a:t>
+            </a:r>
+            <a:r>
+              <a:rPr lang="en-US" dirty="0" err="1"/>
+              <a:t>PrivatLinux</a:t>
+            </a:r>
+            <a:r>
+              <a:rPr lang="en-US" dirty="0"/>
+              <a:t> was one of my successful projects at the Bank. </a:t>
+            </a:r>
+          </a:p>
+          <a:p>
+            <a:r>
+              <a:rPr lang="en-US" dirty="0"/>
+              <a:t>I’ve occupied a different positions but love to black screen with green letters I carry out through all my life.</a:t>
+            </a:r>
+          </a:p>
+          <a:p>
+            <a:endParaRPr lang="ru-UA" dirty="0"/>
+          </a:p>
+        </p:txBody>
+      </p:sp>
     </p:spTree>
   </p:cSld>
   <p:clrMapOvr>
@@ -4262,1678 +4823,6 @@
 
 <file path=ppt/slides/slide4.xml><?xml version="1.0" encoding="utf-8"?>
 <p:sld xmlns:a="http://schemas.openxmlformats.org/drawingml/2006/main" xmlns:r="http://schemas.openxmlformats.org/officeDocument/2006/relationships" xmlns:p="http://schemas.openxmlformats.org/presentationml/2006/main">
-  <p:cSld>
-    <p:spTree>
-      <p:nvGrpSpPr>
-        <p:cNvPr id="1" name=""/>
-        <p:cNvGrpSpPr/>
-        <p:nvPr/>
-      </p:nvGrpSpPr>
-      <p:grpSpPr>
-        <a:xfrm>
-          <a:off x="0" y="0"/>
-          <a:ext cx="0" cy="0"/>
-          <a:chOff x="0" y="0"/>
-          <a:chExt cx="0" cy="0"/>
-        </a:xfrm>
-      </p:grpSpPr>
-      <p:pic>
-        <p:nvPicPr>
-          <p:cNvPr id="11" name="Рисунок 10">
-            <a:extLst>
-              <a:ext uri="{FF2B5EF4-FFF2-40B4-BE49-F238E27FC236}">
-                <a16:creationId xmlns:a16="http://schemas.microsoft.com/office/drawing/2014/main" id="{5ACAF87C-641E-5629-FAEB-FBA83EB2DF59}"/>
-              </a:ext>
-            </a:extLst>
-          </p:cNvPr>
-          <p:cNvPicPr>
-            <a:picLocks noChangeAspect="1"/>
-          </p:cNvPicPr>
-          <p:nvPr/>
-        </p:nvPicPr>
-        <p:blipFill>
-          <a:blip r:embed="rId2">
-            <a:extLst>
-              <a:ext uri="{28A0092B-C50C-407E-A947-70E740481C1C}">
-                <a14:useLocalDpi xmlns:a14="http://schemas.microsoft.com/office/drawing/2010/main" val="0"/>
-              </a:ext>
-            </a:extLst>
-          </a:blip>
-          <a:stretch>
-            <a:fillRect/>
-          </a:stretch>
-        </p:blipFill>
-        <p:spPr>
-          <a:xfrm>
-            <a:off x="-2019300" y="-710277"/>
-            <a:ext cx="13186286" cy="6922800"/>
-          </a:xfrm>
-          <a:prstGeom prst="rect">
-            <a:avLst/>
-          </a:prstGeom>
-        </p:spPr>
-      </p:pic>
-      <p:sp>
-        <p:nvSpPr>
-          <p:cNvPr id="2" name="object 2"/>
-          <p:cNvSpPr txBox="1">
-            <a:spLocks noGrp="1"/>
-          </p:cNvSpPr>
-          <p:nvPr>
-            <p:ph type="title"/>
-          </p:nvPr>
-        </p:nvSpPr>
-        <p:spPr>
-          <a:prstGeom prst="rect">
-            <a:avLst/>
-          </a:prstGeom>
-        </p:spPr>
-        <p:txBody>
-          <a:bodyPr vert="horz" wrap="square" lIns="0" tIns="13335" rIns="0" bIns="0" rtlCol="0">
-            <a:spAutoFit/>
-          </a:bodyPr>
-          <a:lstStyle/>
-          <a:p>
-            <a:pPr marL="12700">
-              <a:lnSpc>
-                <a:spcPct val="100000"/>
-              </a:lnSpc>
-              <a:spcBef>
-                <a:spcPts val="105"/>
-              </a:spcBef>
-            </a:pPr>
-            <a:r>
-              <a:rPr lang="en-US" spc="65" dirty="0"/>
-              <a:t>Scheme of environment</a:t>
-            </a:r>
-            <a:endParaRPr spc="60" dirty="0"/>
-          </a:p>
-        </p:txBody>
-      </p:sp>
-      <p:sp>
-        <p:nvSpPr>
-          <p:cNvPr id="4" name="object 4"/>
-          <p:cNvSpPr txBox="1">
-            <a:spLocks noGrp="1"/>
-          </p:cNvSpPr>
-          <p:nvPr>
-            <p:ph type="sldNum" sz="quarter" idx="7"/>
-          </p:nvPr>
-        </p:nvSpPr>
-        <p:spPr>
-          <a:prstGeom prst="rect">
-            <a:avLst/>
-          </a:prstGeom>
-        </p:spPr>
-        <p:txBody>
-          <a:bodyPr vert="horz" wrap="square" lIns="0" tIns="0" rIns="0" bIns="0" rtlCol="0">
-            <a:spAutoFit/>
-          </a:bodyPr>
-          <a:lstStyle/>
-          <a:p>
-            <a:pPr marL="127635">
-              <a:lnSpc>
-                <a:spcPts val="1435"/>
-              </a:lnSpc>
-            </a:pPr>
-            <a:fld id="{81D60167-4931-47E6-BA6A-407CBD079E47}" type="slidenum">
-              <a:rPr dirty="0"/>
-              <a:t>4</a:t>
-            </a:fld>
-            <a:endParaRPr dirty="0"/>
-          </a:p>
-        </p:txBody>
-      </p:sp>
-      <p:pic>
-        <p:nvPicPr>
-          <p:cNvPr id="6" name="Рисунок 5">
-            <a:extLst>
-              <a:ext uri="{FF2B5EF4-FFF2-40B4-BE49-F238E27FC236}">
-                <a16:creationId xmlns:a16="http://schemas.microsoft.com/office/drawing/2014/main" id="{3573A994-65D3-8C21-1245-454B095A4E94}"/>
-              </a:ext>
-            </a:extLst>
-          </p:cNvPr>
-          <p:cNvPicPr>
-            <a:picLocks noChangeAspect="1"/>
-          </p:cNvPicPr>
-          <p:nvPr/>
-        </p:nvPicPr>
-        <p:blipFill>
-          <a:blip r:embed="rId3">
-            <a:extLst>
-              <a:ext uri="{28A0092B-C50C-407E-A947-70E740481C1C}">
-                <a14:useLocalDpi xmlns:a14="http://schemas.microsoft.com/office/drawing/2010/main" val="0"/>
-              </a:ext>
-            </a:extLst>
-          </a:blip>
-          <a:stretch>
-            <a:fillRect/>
-          </a:stretch>
-        </p:blipFill>
-        <p:spPr>
-          <a:xfrm>
-            <a:off x="1447800" y="1085663"/>
-            <a:ext cx="1397000" cy="1512094"/>
-          </a:xfrm>
-          <a:prstGeom prst="rect">
-            <a:avLst/>
-          </a:prstGeom>
-        </p:spPr>
-      </p:pic>
-      <p:pic>
-        <p:nvPicPr>
-          <p:cNvPr id="7" name="Рисунок 6">
-            <a:extLst>
-              <a:ext uri="{FF2B5EF4-FFF2-40B4-BE49-F238E27FC236}">
-                <a16:creationId xmlns:a16="http://schemas.microsoft.com/office/drawing/2014/main" id="{F24EA1BA-27E0-CED0-0CC9-CFCD0E7143B0}"/>
-              </a:ext>
-            </a:extLst>
-          </p:cNvPr>
-          <p:cNvPicPr>
-            <a:picLocks noChangeAspect="1"/>
-          </p:cNvPicPr>
-          <p:nvPr/>
-        </p:nvPicPr>
-        <p:blipFill>
-          <a:blip r:embed="rId3">
-            <a:extLst>
-              <a:ext uri="{28A0092B-C50C-407E-A947-70E740481C1C}">
-                <a14:useLocalDpi xmlns:a14="http://schemas.microsoft.com/office/drawing/2010/main" val="0"/>
-              </a:ext>
-            </a:extLst>
-          </a:blip>
-          <a:stretch>
-            <a:fillRect/>
-          </a:stretch>
-        </p:blipFill>
-        <p:spPr>
-          <a:xfrm>
-            <a:off x="1600200" y="1238063"/>
-            <a:ext cx="1397000" cy="1512094"/>
-          </a:xfrm>
-          <a:prstGeom prst="rect">
-            <a:avLst/>
-          </a:prstGeom>
-        </p:spPr>
-      </p:pic>
-      <p:pic>
-        <p:nvPicPr>
-          <p:cNvPr id="8" name="Рисунок 7">
-            <a:extLst>
-              <a:ext uri="{FF2B5EF4-FFF2-40B4-BE49-F238E27FC236}">
-                <a16:creationId xmlns:a16="http://schemas.microsoft.com/office/drawing/2014/main" id="{362DC504-CFBD-0014-2715-4793E212CC96}"/>
-              </a:ext>
-            </a:extLst>
-          </p:cNvPr>
-          <p:cNvPicPr>
-            <a:picLocks noChangeAspect="1"/>
-          </p:cNvPicPr>
-          <p:nvPr/>
-        </p:nvPicPr>
-        <p:blipFill>
-          <a:blip r:embed="rId3">
-            <a:extLst>
-              <a:ext uri="{28A0092B-C50C-407E-A947-70E740481C1C}">
-                <a14:useLocalDpi xmlns:a14="http://schemas.microsoft.com/office/drawing/2010/main" val="0"/>
-              </a:ext>
-            </a:extLst>
-          </a:blip>
-          <a:stretch>
-            <a:fillRect/>
-          </a:stretch>
-        </p:blipFill>
-        <p:spPr>
-          <a:xfrm>
-            <a:off x="6019800" y="1059656"/>
-            <a:ext cx="1397000" cy="1512094"/>
-          </a:xfrm>
-          <a:prstGeom prst="rect">
-            <a:avLst/>
-          </a:prstGeom>
-        </p:spPr>
-      </p:pic>
-      <p:pic>
-        <p:nvPicPr>
-          <p:cNvPr id="9" name="Рисунок 8">
-            <a:extLst>
-              <a:ext uri="{FF2B5EF4-FFF2-40B4-BE49-F238E27FC236}">
-                <a16:creationId xmlns:a16="http://schemas.microsoft.com/office/drawing/2014/main" id="{42C97718-175F-9343-9B10-099A9DADC24E}"/>
-              </a:ext>
-            </a:extLst>
-          </p:cNvPr>
-          <p:cNvPicPr>
-            <a:picLocks noChangeAspect="1"/>
-          </p:cNvPicPr>
-          <p:nvPr/>
-        </p:nvPicPr>
-        <p:blipFill>
-          <a:blip r:embed="rId3">
-            <a:extLst>
-              <a:ext uri="{28A0092B-C50C-407E-A947-70E740481C1C}">
-                <a14:useLocalDpi xmlns:a14="http://schemas.microsoft.com/office/drawing/2010/main" val="0"/>
-              </a:ext>
-            </a:extLst>
-          </a:blip>
-          <a:stretch>
-            <a:fillRect/>
-          </a:stretch>
-        </p:blipFill>
-        <p:spPr>
-          <a:xfrm>
-            <a:off x="3569550" y="3105150"/>
-            <a:ext cx="1397000" cy="1512094"/>
-          </a:xfrm>
-          <a:prstGeom prst="rect">
-            <a:avLst/>
-          </a:prstGeom>
-        </p:spPr>
-      </p:pic>
-      <p:pic>
-        <p:nvPicPr>
-          <p:cNvPr id="13" name="Рисунок 12">
-            <a:extLst>
-              <a:ext uri="{FF2B5EF4-FFF2-40B4-BE49-F238E27FC236}">
-                <a16:creationId xmlns:a16="http://schemas.microsoft.com/office/drawing/2014/main" id="{FD2245EC-CAF1-403B-7177-79AEC2371BF5}"/>
-              </a:ext>
-            </a:extLst>
-          </p:cNvPr>
-          <p:cNvPicPr>
-            <a:picLocks noChangeAspect="1"/>
-          </p:cNvPicPr>
-          <p:nvPr/>
-        </p:nvPicPr>
-        <p:blipFill>
-          <a:blip r:embed="rId4">
-            <a:extLst>
-              <a:ext uri="{28A0092B-C50C-407E-A947-70E740481C1C}">
-                <a14:useLocalDpi xmlns:a14="http://schemas.microsoft.com/office/drawing/2010/main" val="0"/>
-              </a:ext>
-            </a:extLst>
-          </a:blip>
-          <a:stretch>
-            <a:fillRect/>
-          </a:stretch>
-        </p:blipFill>
-        <p:spPr>
-          <a:xfrm>
-            <a:off x="736166" y="883413"/>
-            <a:ext cx="896502" cy="498923"/>
-          </a:xfrm>
-          <a:prstGeom prst="rect">
-            <a:avLst/>
-          </a:prstGeom>
-        </p:spPr>
-      </p:pic>
-      <p:pic>
-        <p:nvPicPr>
-          <p:cNvPr id="15" name="Рисунок 14">
-            <a:extLst>
-              <a:ext uri="{FF2B5EF4-FFF2-40B4-BE49-F238E27FC236}">
-                <a16:creationId xmlns:a16="http://schemas.microsoft.com/office/drawing/2014/main" id="{0CAF55CC-5974-3D14-57D3-6C10B682BDBF}"/>
-              </a:ext>
-            </a:extLst>
-          </p:cNvPr>
-          <p:cNvPicPr>
-            <a:picLocks noChangeAspect="1"/>
-          </p:cNvPicPr>
-          <p:nvPr/>
-        </p:nvPicPr>
-        <p:blipFill>
-          <a:blip r:embed="rId5">
-            <a:extLst>
-              <a:ext uri="{28A0092B-C50C-407E-A947-70E740481C1C}">
-                <a14:useLocalDpi xmlns:a14="http://schemas.microsoft.com/office/drawing/2010/main" val="0"/>
-              </a:ext>
-            </a:extLst>
-          </a:blip>
-          <a:stretch>
-            <a:fillRect/>
-          </a:stretch>
-        </p:blipFill>
-        <p:spPr>
-          <a:xfrm>
-            <a:off x="779145" y="1414032"/>
-            <a:ext cx="744855" cy="526256"/>
-          </a:xfrm>
-          <a:prstGeom prst="rect">
-            <a:avLst/>
-          </a:prstGeom>
-        </p:spPr>
-      </p:pic>
-      <p:pic>
-        <p:nvPicPr>
-          <p:cNvPr id="17" name="Рисунок 16">
-            <a:extLst>
-              <a:ext uri="{FF2B5EF4-FFF2-40B4-BE49-F238E27FC236}">
-                <a16:creationId xmlns:a16="http://schemas.microsoft.com/office/drawing/2014/main" id="{B2729C72-EE02-37C6-9201-E3E3CF9B9E92}"/>
-              </a:ext>
-            </a:extLst>
-          </p:cNvPr>
-          <p:cNvPicPr>
-            <a:picLocks noChangeAspect="1"/>
-          </p:cNvPicPr>
-          <p:nvPr/>
-        </p:nvPicPr>
-        <p:blipFill>
-          <a:blip r:embed="rId6">
-            <a:extLst>
-              <a:ext uri="{28A0092B-C50C-407E-A947-70E740481C1C}">
-                <a14:useLocalDpi xmlns:a14="http://schemas.microsoft.com/office/drawing/2010/main" val="0"/>
-              </a:ext>
-              <a:ext uri="{96DAC541-7B7A-43D3-8B79-37D633B846F1}">
-                <asvg:svgBlip xmlns:asvg="http://schemas.microsoft.com/office/drawing/2016/SVG/main" r:embed="rId7"/>
-              </a:ext>
-            </a:extLst>
-          </a:blip>
-          <a:stretch>
-            <a:fillRect/>
-          </a:stretch>
-        </p:blipFill>
-        <p:spPr>
-          <a:xfrm>
-            <a:off x="802410" y="1961404"/>
-            <a:ext cx="531023" cy="590550"/>
-          </a:xfrm>
-          <a:prstGeom prst="rect">
-            <a:avLst/>
-          </a:prstGeom>
-        </p:spPr>
-      </p:pic>
-      <p:pic>
-        <p:nvPicPr>
-          <p:cNvPr id="19" name="Рисунок 18">
-            <a:extLst>
-              <a:ext uri="{FF2B5EF4-FFF2-40B4-BE49-F238E27FC236}">
-                <a16:creationId xmlns:a16="http://schemas.microsoft.com/office/drawing/2014/main" id="{BDAB027D-AB1C-1EC3-9F2E-FF0EE7E80090}"/>
-              </a:ext>
-            </a:extLst>
-          </p:cNvPr>
-          <p:cNvPicPr>
-            <a:picLocks noChangeAspect="1"/>
-          </p:cNvPicPr>
-          <p:nvPr/>
-        </p:nvPicPr>
-        <p:blipFill>
-          <a:blip r:embed="rId8">
-            <a:extLst>
-              <a:ext uri="{28A0092B-C50C-407E-A947-70E740481C1C}">
-                <a14:useLocalDpi xmlns:a14="http://schemas.microsoft.com/office/drawing/2010/main" val="0"/>
-              </a:ext>
-              <a:ext uri="{96DAC541-7B7A-43D3-8B79-37D633B846F1}">
-                <asvg:svgBlip xmlns:asvg="http://schemas.microsoft.com/office/drawing/2016/SVG/main" r:embed="rId9"/>
-              </a:ext>
-            </a:extLst>
-          </a:blip>
-          <a:stretch>
-            <a:fillRect/>
-          </a:stretch>
-        </p:blipFill>
-        <p:spPr>
-          <a:xfrm>
-            <a:off x="802410" y="2621152"/>
-            <a:ext cx="579577" cy="582061"/>
-          </a:xfrm>
-          <a:prstGeom prst="rect">
-            <a:avLst/>
-          </a:prstGeom>
-        </p:spPr>
-      </p:pic>
-      <p:sp>
-        <p:nvSpPr>
-          <p:cNvPr id="20" name="TextBox 19">
-            <a:extLst>
-              <a:ext uri="{FF2B5EF4-FFF2-40B4-BE49-F238E27FC236}">
-                <a16:creationId xmlns:a16="http://schemas.microsoft.com/office/drawing/2014/main" id="{B389A69D-87D0-355F-83CD-32BEF7530D6B}"/>
-              </a:ext>
-            </a:extLst>
-          </p:cNvPr>
-          <p:cNvSpPr txBox="1"/>
-          <p:nvPr/>
-        </p:nvSpPr>
-        <p:spPr>
-          <a:xfrm>
-            <a:off x="1741115" y="868731"/>
-            <a:ext cx="889987" cy="369332"/>
-          </a:xfrm>
-          <a:prstGeom prst="rect">
-            <a:avLst/>
-          </a:prstGeom>
-          <a:noFill/>
-        </p:spPr>
-        <p:txBody>
-          <a:bodyPr wrap="none" rtlCol="0">
-            <a:spAutoFit/>
-          </a:bodyPr>
-          <a:lstStyle/>
-          <a:p>
-            <a:r>
-              <a:rPr lang="en-US" dirty="0"/>
-              <a:t>Master</a:t>
-            </a:r>
-            <a:endParaRPr lang="ru-UA" dirty="0"/>
-          </a:p>
-        </p:txBody>
-      </p:sp>
-      <p:sp>
-        <p:nvSpPr>
-          <p:cNvPr id="21" name="TextBox 20">
-            <a:extLst>
-              <a:ext uri="{FF2B5EF4-FFF2-40B4-BE49-F238E27FC236}">
-                <a16:creationId xmlns:a16="http://schemas.microsoft.com/office/drawing/2014/main" id="{5FA72601-DE1E-19A0-CEBF-A231886D1D97}"/>
-              </a:ext>
-            </a:extLst>
-          </p:cNvPr>
-          <p:cNvSpPr txBox="1"/>
-          <p:nvPr/>
-        </p:nvSpPr>
-        <p:spPr>
-          <a:xfrm>
-            <a:off x="4015437" y="2833881"/>
-            <a:ext cx="556563" cy="369332"/>
-          </a:xfrm>
-          <a:prstGeom prst="rect">
-            <a:avLst/>
-          </a:prstGeom>
-          <a:noFill/>
-        </p:spPr>
-        <p:txBody>
-          <a:bodyPr wrap="none" rtlCol="0">
-            <a:spAutoFit/>
-          </a:bodyPr>
-          <a:lstStyle/>
-          <a:p>
-            <a:r>
-              <a:rPr lang="en-US" dirty="0"/>
-              <a:t>dev</a:t>
-            </a:r>
-            <a:endParaRPr lang="ru-UA" dirty="0"/>
-          </a:p>
-        </p:txBody>
-      </p:sp>
-      <p:sp>
-        <p:nvSpPr>
-          <p:cNvPr id="22" name="TextBox 21">
-            <a:extLst>
-              <a:ext uri="{FF2B5EF4-FFF2-40B4-BE49-F238E27FC236}">
-                <a16:creationId xmlns:a16="http://schemas.microsoft.com/office/drawing/2014/main" id="{D15E4A6B-DE4E-6C38-B17E-CA2E61716DDD}"/>
-              </a:ext>
-            </a:extLst>
-          </p:cNvPr>
-          <p:cNvSpPr txBox="1"/>
-          <p:nvPr/>
-        </p:nvSpPr>
-        <p:spPr>
-          <a:xfrm>
-            <a:off x="6311900" y="781483"/>
-            <a:ext cx="800219" cy="369332"/>
-          </a:xfrm>
-          <a:prstGeom prst="rect">
-            <a:avLst/>
-          </a:prstGeom>
-          <a:noFill/>
-        </p:spPr>
-        <p:txBody>
-          <a:bodyPr wrap="none" rtlCol="0">
-            <a:spAutoFit/>
-          </a:bodyPr>
-          <a:lstStyle/>
-          <a:p>
-            <a:r>
-              <a:rPr lang="en-US" dirty="0" err="1"/>
-              <a:t>Kuber</a:t>
-            </a:r>
-            <a:endParaRPr lang="ru-UA" dirty="0"/>
-          </a:p>
-        </p:txBody>
-      </p:sp>
-      <p:pic>
-        <p:nvPicPr>
-          <p:cNvPr id="23" name="Рисунок 22">
-            <a:extLst>
-              <a:ext uri="{FF2B5EF4-FFF2-40B4-BE49-F238E27FC236}">
-                <a16:creationId xmlns:a16="http://schemas.microsoft.com/office/drawing/2014/main" id="{1D30EF66-F9B0-EF59-F653-7FD469825451}"/>
-              </a:ext>
-            </a:extLst>
-          </p:cNvPr>
-          <p:cNvPicPr>
-            <a:picLocks noChangeAspect="1"/>
-          </p:cNvPicPr>
-          <p:nvPr/>
-        </p:nvPicPr>
-        <p:blipFill>
-          <a:blip r:embed="rId5">
-            <a:extLst>
-              <a:ext uri="{28A0092B-C50C-407E-A947-70E740481C1C}">
-                <a14:useLocalDpi xmlns:a14="http://schemas.microsoft.com/office/drawing/2010/main" val="0"/>
-              </a:ext>
-            </a:extLst>
-          </a:blip>
-          <a:stretch>
-            <a:fillRect/>
-          </a:stretch>
-        </p:blipFill>
-        <p:spPr>
-          <a:xfrm>
-            <a:off x="4791398" y="3184318"/>
-            <a:ext cx="744855" cy="526256"/>
-          </a:xfrm>
-          <a:prstGeom prst="rect">
-            <a:avLst/>
-          </a:prstGeom>
-        </p:spPr>
-      </p:pic>
-      <p:pic>
-        <p:nvPicPr>
-          <p:cNvPr id="24" name="Рисунок 23">
-            <a:extLst>
-              <a:ext uri="{FF2B5EF4-FFF2-40B4-BE49-F238E27FC236}">
-                <a16:creationId xmlns:a16="http://schemas.microsoft.com/office/drawing/2014/main" id="{5398EF64-37FE-93FB-5EEC-A182F390EB0D}"/>
-              </a:ext>
-            </a:extLst>
-          </p:cNvPr>
-          <p:cNvPicPr>
-            <a:picLocks noChangeAspect="1"/>
-          </p:cNvPicPr>
-          <p:nvPr/>
-        </p:nvPicPr>
-        <p:blipFill>
-          <a:blip r:embed="rId5">
-            <a:extLst>
-              <a:ext uri="{28A0092B-C50C-407E-A947-70E740481C1C}">
-                <a14:useLocalDpi xmlns:a14="http://schemas.microsoft.com/office/drawing/2010/main" val="0"/>
-              </a:ext>
-            </a:extLst>
-          </a:blip>
-          <a:stretch>
-            <a:fillRect/>
-          </a:stretch>
-        </p:blipFill>
-        <p:spPr>
-          <a:xfrm>
-            <a:off x="7381586" y="3959540"/>
-            <a:ext cx="744855" cy="526256"/>
-          </a:xfrm>
-          <a:prstGeom prst="rect">
-            <a:avLst/>
-          </a:prstGeom>
-        </p:spPr>
-      </p:pic>
-      <p:pic>
-        <p:nvPicPr>
-          <p:cNvPr id="26" name="Рисунок 25">
-            <a:extLst>
-              <a:ext uri="{FF2B5EF4-FFF2-40B4-BE49-F238E27FC236}">
-                <a16:creationId xmlns:a16="http://schemas.microsoft.com/office/drawing/2014/main" id="{3E7D4BC0-330F-3E2A-FD65-23059063A2AB}"/>
-              </a:ext>
-            </a:extLst>
-          </p:cNvPr>
-          <p:cNvPicPr>
-            <a:picLocks noChangeAspect="1"/>
-          </p:cNvPicPr>
-          <p:nvPr/>
-        </p:nvPicPr>
-        <p:blipFill>
-          <a:blip r:embed="rId10">
-            <a:extLst>
-              <a:ext uri="{28A0092B-C50C-407E-A947-70E740481C1C}">
-                <a14:useLocalDpi xmlns:a14="http://schemas.microsoft.com/office/drawing/2010/main" val="0"/>
-              </a:ext>
-            </a:extLst>
-          </a:blip>
-          <a:stretch>
-            <a:fillRect/>
-          </a:stretch>
-        </p:blipFill>
-        <p:spPr>
-          <a:xfrm>
-            <a:off x="7410328" y="1382336"/>
-            <a:ext cx="542671" cy="526256"/>
-          </a:xfrm>
-          <a:prstGeom prst="rect">
-            <a:avLst/>
-          </a:prstGeom>
-        </p:spPr>
-      </p:pic>
-      <p:pic>
-        <p:nvPicPr>
-          <p:cNvPr id="28" name="Рисунок 27">
-            <a:extLst>
-              <a:ext uri="{FF2B5EF4-FFF2-40B4-BE49-F238E27FC236}">
-                <a16:creationId xmlns:a16="http://schemas.microsoft.com/office/drawing/2014/main" id="{57BCCBC6-964C-3DFF-6B66-EA3B87589A94}"/>
-              </a:ext>
-            </a:extLst>
-          </p:cNvPr>
-          <p:cNvPicPr>
-            <a:picLocks noChangeAspect="1"/>
-          </p:cNvPicPr>
-          <p:nvPr/>
-        </p:nvPicPr>
-        <p:blipFill>
-          <a:blip r:embed="rId11">
-            <a:extLst>
-              <a:ext uri="{28A0092B-C50C-407E-A947-70E740481C1C}">
-                <a14:useLocalDpi xmlns:a14="http://schemas.microsoft.com/office/drawing/2010/main" val="0"/>
-              </a:ext>
-              <a:ext uri="{96DAC541-7B7A-43D3-8B79-37D633B846F1}">
-                <asvg:svgBlip xmlns:asvg="http://schemas.microsoft.com/office/drawing/2016/SVG/main" r:embed="rId12"/>
-              </a:ext>
-            </a:extLst>
-          </a:blip>
-          <a:stretch>
-            <a:fillRect/>
-          </a:stretch>
-        </p:blipFill>
-        <p:spPr>
-          <a:xfrm>
-            <a:off x="7381586" y="1956016"/>
-            <a:ext cx="629228" cy="725820"/>
-          </a:xfrm>
-          <a:prstGeom prst="rect">
-            <a:avLst/>
-          </a:prstGeom>
-        </p:spPr>
-      </p:pic>
-      <p:pic>
-        <p:nvPicPr>
-          <p:cNvPr id="29" name="Рисунок 28">
-            <a:extLst>
-              <a:ext uri="{FF2B5EF4-FFF2-40B4-BE49-F238E27FC236}">
-                <a16:creationId xmlns:a16="http://schemas.microsoft.com/office/drawing/2014/main" id="{F889C6C0-8F7A-A199-F4F5-EB773A101EA5}"/>
-              </a:ext>
-            </a:extLst>
-          </p:cNvPr>
-          <p:cNvPicPr>
-            <a:picLocks noChangeAspect="1"/>
-          </p:cNvPicPr>
-          <p:nvPr/>
-        </p:nvPicPr>
-        <p:blipFill>
-          <a:blip r:embed="rId8">
-            <a:extLst>
-              <a:ext uri="{28A0092B-C50C-407E-A947-70E740481C1C}">
-                <a14:useLocalDpi xmlns:a14="http://schemas.microsoft.com/office/drawing/2010/main" val="0"/>
-              </a:ext>
-              <a:ext uri="{96DAC541-7B7A-43D3-8B79-37D633B846F1}">
-                <asvg:svgBlip xmlns:asvg="http://schemas.microsoft.com/office/drawing/2016/SVG/main" r:embed="rId9"/>
-              </a:ext>
-            </a:extLst>
-          </a:blip>
-          <a:stretch>
-            <a:fillRect/>
-          </a:stretch>
-        </p:blipFill>
-        <p:spPr>
-          <a:xfrm>
-            <a:off x="7394677" y="2750157"/>
-            <a:ext cx="579577" cy="582061"/>
-          </a:xfrm>
-          <a:prstGeom prst="rect">
-            <a:avLst/>
-          </a:prstGeom>
-        </p:spPr>
-      </p:pic>
-      <p:pic>
-        <p:nvPicPr>
-          <p:cNvPr id="31" name="Рисунок 30">
-            <a:extLst>
-              <a:ext uri="{FF2B5EF4-FFF2-40B4-BE49-F238E27FC236}">
-                <a16:creationId xmlns:a16="http://schemas.microsoft.com/office/drawing/2014/main" id="{519EED90-36E7-190A-0245-F347829D2808}"/>
-              </a:ext>
-            </a:extLst>
-          </p:cNvPr>
-          <p:cNvPicPr>
-            <a:picLocks noChangeAspect="1"/>
-          </p:cNvPicPr>
-          <p:nvPr/>
-        </p:nvPicPr>
-        <p:blipFill>
-          <a:blip r:embed="rId13">
-            <a:extLst>
-              <a:ext uri="{28A0092B-C50C-407E-A947-70E740481C1C}">
-                <a14:useLocalDpi xmlns:a14="http://schemas.microsoft.com/office/drawing/2010/main" val="0"/>
-              </a:ext>
-            </a:extLst>
-          </a:blip>
-          <a:stretch>
-            <a:fillRect/>
-          </a:stretch>
-        </p:blipFill>
-        <p:spPr>
-          <a:xfrm>
-            <a:off x="823446" y="3272411"/>
-            <a:ext cx="488950" cy="488950"/>
-          </a:xfrm>
-          <a:prstGeom prst="rect">
-            <a:avLst/>
-          </a:prstGeom>
-        </p:spPr>
-      </p:pic>
-      <p:pic>
-        <p:nvPicPr>
-          <p:cNvPr id="32" name="Рисунок 31">
-            <a:extLst>
-              <a:ext uri="{FF2B5EF4-FFF2-40B4-BE49-F238E27FC236}">
-                <a16:creationId xmlns:a16="http://schemas.microsoft.com/office/drawing/2014/main" id="{DE63E139-CB4E-0523-921D-A01D4ED9A86B}"/>
-              </a:ext>
-            </a:extLst>
-          </p:cNvPr>
-          <p:cNvPicPr>
-            <a:picLocks noChangeAspect="1"/>
-          </p:cNvPicPr>
-          <p:nvPr/>
-        </p:nvPicPr>
-        <p:blipFill>
-          <a:blip r:embed="rId13">
-            <a:extLst>
-              <a:ext uri="{28A0092B-C50C-407E-A947-70E740481C1C}">
-                <a14:useLocalDpi xmlns:a14="http://schemas.microsoft.com/office/drawing/2010/main" val="0"/>
-              </a:ext>
-            </a:extLst>
-          </a:blip>
-          <a:stretch>
-            <a:fillRect/>
-          </a:stretch>
-        </p:blipFill>
-        <p:spPr>
-          <a:xfrm>
-            <a:off x="7451724" y="3416417"/>
-            <a:ext cx="488950" cy="488950"/>
-          </a:xfrm>
-          <a:prstGeom prst="rect">
-            <a:avLst/>
-          </a:prstGeom>
-        </p:spPr>
-      </p:pic>
-      <p:pic>
-        <p:nvPicPr>
-          <p:cNvPr id="34" name="Рисунок 33">
-            <a:extLst>
-              <a:ext uri="{FF2B5EF4-FFF2-40B4-BE49-F238E27FC236}">
-                <a16:creationId xmlns:a16="http://schemas.microsoft.com/office/drawing/2014/main" id="{25366365-8590-C9F8-A4DE-0BD646058237}"/>
-              </a:ext>
-            </a:extLst>
-          </p:cNvPr>
-          <p:cNvPicPr>
-            <a:picLocks noChangeAspect="1"/>
-          </p:cNvPicPr>
-          <p:nvPr/>
-        </p:nvPicPr>
-        <p:blipFill>
-          <a:blip r:embed="rId14">
-            <a:extLst>
-              <a:ext uri="{28A0092B-C50C-407E-A947-70E740481C1C}">
-                <a14:useLocalDpi xmlns:a14="http://schemas.microsoft.com/office/drawing/2010/main" val="0"/>
-              </a:ext>
-            </a:extLst>
-          </a:blip>
-          <a:stretch>
-            <a:fillRect/>
-          </a:stretch>
-        </p:blipFill>
-        <p:spPr>
-          <a:xfrm>
-            <a:off x="7377256" y="726614"/>
-            <a:ext cx="608814" cy="590550"/>
-          </a:xfrm>
-          <a:prstGeom prst="rect">
-            <a:avLst/>
-          </a:prstGeom>
-        </p:spPr>
-      </p:pic>
-      <p:pic>
-        <p:nvPicPr>
-          <p:cNvPr id="35" name="Рисунок 34">
-            <a:extLst>
-              <a:ext uri="{FF2B5EF4-FFF2-40B4-BE49-F238E27FC236}">
-                <a16:creationId xmlns:a16="http://schemas.microsoft.com/office/drawing/2014/main" id="{0B66D39F-6216-8FC8-3342-4BABD5D8BACC}"/>
-              </a:ext>
-            </a:extLst>
-          </p:cNvPr>
-          <p:cNvPicPr>
-            <a:picLocks noChangeAspect="1"/>
-          </p:cNvPicPr>
-          <p:nvPr/>
-        </p:nvPicPr>
-        <p:blipFill>
-          <a:blip r:embed="rId4">
-            <a:extLst>
-              <a:ext uri="{28A0092B-C50C-407E-A947-70E740481C1C}">
-                <a14:useLocalDpi xmlns:a14="http://schemas.microsoft.com/office/drawing/2010/main" val="0"/>
-              </a:ext>
-            </a:extLst>
-          </a:blip>
-          <a:stretch>
-            <a:fillRect/>
-          </a:stretch>
-        </p:blipFill>
-        <p:spPr>
-          <a:xfrm>
-            <a:off x="4730226" y="2681836"/>
-            <a:ext cx="896502" cy="498923"/>
-          </a:xfrm>
-          <a:prstGeom prst="rect">
-            <a:avLst/>
-          </a:prstGeom>
-        </p:spPr>
-      </p:pic>
-      <p:pic>
-        <p:nvPicPr>
-          <p:cNvPr id="36" name="Рисунок 35">
-            <a:extLst>
-              <a:ext uri="{FF2B5EF4-FFF2-40B4-BE49-F238E27FC236}">
-                <a16:creationId xmlns:a16="http://schemas.microsoft.com/office/drawing/2014/main" id="{1F18D5B9-4637-E214-0437-FDA7DC60AE95}"/>
-              </a:ext>
-            </a:extLst>
-          </p:cNvPr>
-          <p:cNvPicPr>
-            <a:picLocks noChangeAspect="1"/>
-          </p:cNvPicPr>
-          <p:nvPr/>
-        </p:nvPicPr>
-        <p:blipFill>
-          <a:blip r:embed="rId4">
-            <a:extLst>
-              <a:ext uri="{28A0092B-C50C-407E-A947-70E740481C1C}">
-                <a14:useLocalDpi xmlns:a14="http://schemas.microsoft.com/office/drawing/2010/main" val="0"/>
-              </a:ext>
-            </a:extLst>
-          </a:blip>
-          <a:stretch>
-            <a:fillRect/>
-          </a:stretch>
-        </p:blipFill>
-        <p:spPr>
-          <a:xfrm>
-            <a:off x="7305762" y="4490680"/>
-            <a:ext cx="896502" cy="498923"/>
-          </a:xfrm>
-          <a:prstGeom prst="rect">
-            <a:avLst/>
-          </a:prstGeom>
-        </p:spPr>
-      </p:pic>
-    </p:spTree>
-  </p:cSld>
-  <p:clrMapOvr>
-    <a:masterClrMapping/>
-  </p:clrMapOvr>
-</p:sld>
-</file>
-
-<file path=ppt/slides/slide5.xml><?xml version="1.0" encoding="utf-8"?>
-<p:sld xmlns:a="http://schemas.openxmlformats.org/drawingml/2006/main" xmlns:r="http://schemas.openxmlformats.org/officeDocument/2006/relationships" xmlns:p="http://schemas.openxmlformats.org/presentationml/2006/main">
-  <p:cSld>
-    <p:spTree>
-      <p:nvGrpSpPr>
-        <p:cNvPr id="1" name=""/>
-        <p:cNvGrpSpPr/>
-        <p:nvPr/>
-      </p:nvGrpSpPr>
-      <p:grpSpPr>
-        <a:xfrm>
-          <a:off x="0" y="0"/>
-          <a:ext cx="0" cy="0"/>
-          <a:chOff x="0" y="0"/>
-          <a:chExt cx="0" cy="0"/>
-        </a:xfrm>
-      </p:grpSpPr>
-      <p:sp>
-        <p:nvSpPr>
-          <p:cNvPr id="2" name="object 2"/>
-          <p:cNvSpPr txBox="1">
-            <a:spLocks noGrp="1"/>
-          </p:cNvSpPr>
-          <p:nvPr>
-            <p:ph type="title"/>
-          </p:nvPr>
-        </p:nvSpPr>
-        <p:spPr>
-          <a:prstGeom prst="rect">
-            <a:avLst/>
-          </a:prstGeom>
-        </p:spPr>
-        <p:txBody>
-          <a:bodyPr vert="horz" wrap="square" lIns="0" tIns="13335" rIns="0" bIns="0" rtlCol="0">
-            <a:spAutoFit/>
-          </a:bodyPr>
-          <a:lstStyle/>
-          <a:p>
-            <a:pPr marL="12700">
-              <a:lnSpc>
-                <a:spcPct val="100000"/>
-              </a:lnSpc>
-              <a:spcBef>
-                <a:spcPts val="105"/>
-              </a:spcBef>
-            </a:pPr>
-            <a:r>
-              <a:rPr lang="en-US" spc="55" dirty="0" err="1"/>
-              <a:t>Terraform’s</a:t>
-            </a:r>
-            <a:r>
-              <a:rPr lang="en-US" spc="55" dirty="0"/>
-              <a:t> objectives</a:t>
-            </a:r>
-            <a:endParaRPr spc="55" dirty="0"/>
-          </a:p>
-        </p:txBody>
-      </p:sp>
-      <p:sp>
-        <p:nvSpPr>
-          <p:cNvPr id="5" name="object 5"/>
-          <p:cNvSpPr txBox="1">
-            <a:spLocks noGrp="1"/>
-          </p:cNvSpPr>
-          <p:nvPr>
-            <p:ph type="sldNum" sz="quarter" idx="7"/>
-          </p:nvPr>
-        </p:nvSpPr>
-        <p:spPr>
-          <a:prstGeom prst="rect">
-            <a:avLst/>
-          </a:prstGeom>
-        </p:spPr>
-        <p:txBody>
-          <a:bodyPr vert="horz" wrap="square" lIns="0" tIns="0" rIns="0" bIns="0" rtlCol="0">
-            <a:spAutoFit/>
-          </a:bodyPr>
-          <a:lstStyle/>
-          <a:p>
-            <a:pPr marL="127635">
-              <a:lnSpc>
-                <a:spcPts val="1435"/>
-              </a:lnSpc>
-            </a:pPr>
-            <a:fld id="{81D60167-4931-47E6-BA6A-407CBD079E47}" type="slidenum">
-              <a:rPr dirty="0"/>
-              <a:t>5</a:t>
-            </a:fld>
-            <a:endParaRPr dirty="0"/>
-          </a:p>
-        </p:txBody>
-      </p:sp>
-      <p:pic>
-        <p:nvPicPr>
-          <p:cNvPr id="7" name="Рисунок 6">
-            <a:extLst>
-              <a:ext uri="{FF2B5EF4-FFF2-40B4-BE49-F238E27FC236}">
-                <a16:creationId xmlns:a16="http://schemas.microsoft.com/office/drawing/2014/main" id="{D9491FA7-DAEE-4C78-43A3-BA32CC83EAA1}"/>
-              </a:ext>
-            </a:extLst>
-          </p:cNvPr>
-          <p:cNvPicPr>
-            <a:picLocks noChangeAspect="1"/>
-          </p:cNvPicPr>
-          <p:nvPr/>
-        </p:nvPicPr>
-        <p:blipFill>
-          <a:blip r:embed="rId2">
-            <a:extLst>
-              <a:ext uri="{28A0092B-C50C-407E-A947-70E740481C1C}">
-                <a14:useLocalDpi xmlns:a14="http://schemas.microsoft.com/office/drawing/2010/main" val="0"/>
-              </a:ext>
-            </a:extLst>
-          </a:blip>
-          <a:stretch>
-            <a:fillRect/>
-          </a:stretch>
-        </p:blipFill>
-        <p:spPr>
-          <a:xfrm>
-            <a:off x="4741026" y="742950"/>
-            <a:ext cx="3810507" cy="3810507"/>
-          </a:xfrm>
-          <a:prstGeom prst="rect">
-            <a:avLst/>
-          </a:prstGeom>
-        </p:spPr>
-      </p:pic>
-      <p:sp>
-        <p:nvSpPr>
-          <p:cNvPr id="8" name="TextBox 7">
-            <a:extLst>
-              <a:ext uri="{FF2B5EF4-FFF2-40B4-BE49-F238E27FC236}">
-                <a16:creationId xmlns:a16="http://schemas.microsoft.com/office/drawing/2014/main" id="{A25CE9E5-ED33-DA97-8AE3-7D020D3CCBF7}"/>
-              </a:ext>
-            </a:extLst>
-          </p:cNvPr>
-          <p:cNvSpPr txBox="1"/>
-          <p:nvPr/>
-        </p:nvSpPr>
-        <p:spPr>
-          <a:xfrm>
-            <a:off x="228600" y="681521"/>
-            <a:ext cx="4953000" cy="4195957"/>
-          </a:xfrm>
-          <a:prstGeom prst="rect">
-            <a:avLst/>
-          </a:prstGeom>
-          <a:noFill/>
-        </p:spPr>
-        <p:txBody>
-          <a:bodyPr wrap="square" rtlCol="0">
-            <a:spAutoFit/>
-          </a:bodyPr>
-          <a:lstStyle/>
-          <a:p>
-            <a:pPr marL="342900" indent="-342900">
-              <a:lnSpc>
-                <a:spcPct val="150000"/>
-              </a:lnSpc>
-              <a:buAutoNum type="arabicPeriod"/>
-            </a:pPr>
-            <a:r>
-              <a:rPr lang="en-US" dirty="0"/>
-              <a:t>Generate a key’s pair</a:t>
-            </a:r>
-          </a:p>
-          <a:p>
-            <a:pPr marL="342900" indent="-342900">
-              <a:lnSpc>
-                <a:spcPct val="150000"/>
-              </a:lnSpc>
-              <a:buAutoNum type="arabicPeriod"/>
-            </a:pPr>
-            <a:r>
-              <a:rPr lang="en-US" dirty="0"/>
-              <a:t>Expand three servers</a:t>
-            </a:r>
-          </a:p>
-          <a:p>
-            <a:pPr marL="342900" indent="-342900">
-              <a:lnSpc>
-                <a:spcPct val="150000"/>
-              </a:lnSpc>
-              <a:buAutoNum type="arabicPeriod"/>
-            </a:pPr>
-            <a:r>
-              <a:rPr lang="en-US" dirty="0"/>
-              <a:t>Put public and private key in certain proper place</a:t>
-            </a:r>
-          </a:p>
-          <a:p>
-            <a:pPr marL="342900" indent="-342900">
-              <a:lnSpc>
-                <a:spcPct val="150000"/>
-              </a:lnSpc>
-              <a:buAutoNum type="arabicPeriod"/>
-            </a:pPr>
-            <a:r>
-              <a:rPr lang="en-US" dirty="0"/>
-              <a:t>Install ansible</a:t>
-            </a:r>
-          </a:p>
-          <a:p>
-            <a:pPr marL="342900" indent="-342900">
-              <a:lnSpc>
-                <a:spcPct val="150000"/>
-              </a:lnSpc>
-              <a:buAutoNum type="arabicPeriod"/>
-            </a:pPr>
-            <a:r>
-              <a:rPr lang="en-US" dirty="0"/>
-              <a:t>Configure ansible</a:t>
-            </a:r>
-          </a:p>
-          <a:p>
-            <a:pPr marL="342900" indent="-342900">
-              <a:lnSpc>
-                <a:spcPct val="150000"/>
-              </a:lnSpc>
-              <a:buAutoNum type="arabicPeriod"/>
-            </a:pPr>
-            <a:r>
-              <a:rPr lang="en-US" dirty="0"/>
-              <a:t>Clone repo from git with playbook</a:t>
-            </a:r>
-          </a:p>
-          <a:p>
-            <a:pPr marL="342900" indent="-342900">
-              <a:lnSpc>
-                <a:spcPct val="150000"/>
-              </a:lnSpc>
-              <a:buAutoNum type="arabicPeriod"/>
-            </a:pPr>
-            <a:r>
-              <a:rPr lang="en-US" dirty="0"/>
-              <a:t>Run playbook</a:t>
-            </a:r>
-          </a:p>
-          <a:p>
-            <a:pPr>
-              <a:lnSpc>
-                <a:spcPct val="150000"/>
-              </a:lnSpc>
-            </a:pPr>
-            <a:r>
-              <a:rPr lang="en-US" dirty="0"/>
-              <a:t>https://</a:t>
-            </a:r>
-            <a:r>
-              <a:rPr lang="en-US" dirty="0" err="1"/>
-              <a:t>github.com</a:t>
-            </a:r>
-            <a:r>
-              <a:rPr lang="en-US" dirty="0"/>
-              <a:t>/</a:t>
-            </a:r>
-            <a:r>
-              <a:rPr lang="en-US" dirty="0" err="1"/>
-              <a:t>ansokoloff</a:t>
-            </a:r>
-            <a:r>
-              <a:rPr lang="en-US" dirty="0"/>
-              <a:t>/infrastructure/blob/main/</a:t>
-            </a:r>
-            <a:r>
-              <a:rPr lang="en-US" dirty="0" err="1"/>
-              <a:t>main.tf</a:t>
-            </a:r>
-            <a:endParaRPr lang="ru-UA" dirty="0"/>
-          </a:p>
-        </p:txBody>
-      </p:sp>
-    </p:spTree>
-  </p:cSld>
-  <p:clrMapOvr>
-    <a:masterClrMapping/>
-  </p:clrMapOvr>
-</p:sld>
-</file>
-
-<file path=ppt/slides/slide6.xml><?xml version="1.0" encoding="utf-8"?>
-<p:sld xmlns:a="http://schemas.openxmlformats.org/drawingml/2006/main" xmlns:r="http://schemas.openxmlformats.org/officeDocument/2006/relationships" xmlns:p="http://schemas.openxmlformats.org/presentationml/2006/main">
-  <p:cSld>
-    <p:spTree>
-      <p:nvGrpSpPr>
-        <p:cNvPr id="1" name=""/>
-        <p:cNvGrpSpPr/>
-        <p:nvPr/>
-      </p:nvGrpSpPr>
-      <p:grpSpPr>
-        <a:xfrm>
-          <a:off x="0" y="0"/>
-          <a:ext cx="0" cy="0"/>
-          <a:chOff x="0" y="0"/>
-          <a:chExt cx="0" cy="0"/>
-        </a:xfrm>
-      </p:grpSpPr>
-      <p:sp>
-        <p:nvSpPr>
-          <p:cNvPr id="2" name="object 2"/>
-          <p:cNvSpPr txBox="1">
-            <a:spLocks noGrp="1"/>
-          </p:cNvSpPr>
-          <p:nvPr>
-            <p:ph type="title"/>
-          </p:nvPr>
-        </p:nvSpPr>
-        <p:spPr>
-          <a:prstGeom prst="rect">
-            <a:avLst/>
-          </a:prstGeom>
-        </p:spPr>
-        <p:txBody>
-          <a:bodyPr vert="horz" wrap="square" lIns="0" tIns="13335" rIns="0" bIns="0" rtlCol="0">
-            <a:spAutoFit/>
-          </a:bodyPr>
-          <a:lstStyle/>
-          <a:p>
-            <a:pPr marL="12700">
-              <a:lnSpc>
-                <a:spcPct val="100000"/>
-              </a:lnSpc>
-              <a:spcBef>
-                <a:spcPts val="105"/>
-              </a:spcBef>
-            </a:pPr>
-            <a:r>
-              <a:rPr lang="en-US" spc="55" dirty="0"/>
-              <a:t>Ansible objectives</a:t>
-            </a:r>
-            <a:endParaRPr spc="55" dirty="0"/>
-          </a:p>
-        </p:txBody>
-      </p:sp>
-      <p:sp>
-        <p:nvSpPr>
-          <p:cNvPr id="5" name="object 5"/>
-          <p:cNvSpPr txBox="1">
-            <a:spLocks noGrp="1"/>
-          </p:cNvSpPr>
-          <p:nvPr>
-            <p:ph type="sldNum" sz="quarter" idx="7"/>
-          </p:nvPr>
-        </p:nvSpPr>
-        <p:spPr>
-          <a:prstGeom prst="rect">
-            <a:avLst/>
-          </a:prstGeom>
-        </p:spPr>
-        <p:txBody>
-          <a:bodyPr vert="horz" wrap="square" lIns="0" tIns="0" rIns="0" bIns="0" rtlCol="0">
-            <a:spAutoFit/>
-          </a:bodyPr>
-          <a:lstStyle/>
-          <a:p>
-            <a:pPr marL="127635">
-              <a:lnSpc>
-                <a:spcPts val="1435"/>
-              </a:lnSpc>
-            </a:pPr>
-            <a:fld id="{81D60167-4931-47E6-BA6A-407CBD079E47}" type="slidenum">
-              <a:rPr dirty="0"/>
-              <a:t>6</a:t>
-            </a:fld>
-            <a:endParaRPr dirty="0"/>
-          </a:p>
-        </p:txBody>
-      </p:sp>
-      <p:sp>
-        <p:nvSpPr>
-          <p:cNvPr id="8" name="TextBox 7">
-            <a:extLst>
-              <a:ext uri="{FF2B5EF4-FFF2-40B4-BE49-F238E27FC236}">
-                <a16:creationId xmlns:a16="http://schemas.microsoft.com/office/drawing/2014/main" id="{A25CE9E5-ED33-DA97-8AE3-7D020D3CCBF7}"/>
-              </a:ext>
-            </a:extLst>
-          </p:cNvPr>
-          <p:cNvSpPr txBox="1"/>
-          <p:nvPr/>
-        </p:nvSpPr>
-        <p:spPr>
-          <a:xfrm>
-            <a:off x="228600" y="681521"/>
-            <a:ext cx="4953000" cy="3780458"/>
-          </a:xfrm>
-          <a:prstGeom prst="rect">
-            <a:avLst/>
-          </a:prstGeom>
-          <a:noFill/>
-        </p:spPr>
-        <p:txBody>
-          <a:bodyPr wrap="square" rtlCol="0">
-            <a:spAutoFit/>
-          </a:bodyPr>
-          <a:lstStyle/>
-          <a:p>
-            <a:pPr marL="342900" indent="-342900">
-              <a:lnSpc>
-                <a:spcPct val="150000"/>
-              </a:lnSpc>
-              <a:buAutoNum type="arabicPeriod"/>
-            </a:pPr>
-            <a:r>
-              <a:rPr lang="en-US" dirty="0"/>
-              <a:t>Install docker</a:t>
-            </a:r>
-          </a:p>
-          <a:p>
-            <a:pPr marL="342900" indent="-342900">
-              <a:lnSpc>
-                <a:spcPct val="150000"/>
-              </a:lnSpc>
-              <a:buAutoNum type="arabicPeriod"/>
-            </a:pPr>
-            <a:r>
-              <a:rPr lang="en-US" dirty="0"/>
-              <a:t>Install common software</a:t>
-            </a:r>
-          </a:p>
-          <a:p>
-            <a:pPr marL="342900" indent="-342900">
-              <a:lnSpc>
-                <a:spcPct val="150000"/>
-              </a:lnSpc>
-              <a:buAutoNum type="arabicPeriod"/>
-            </a:pPr>
-            <a:r>
-              <a:rPr lang="en-US" dirty="0"/>
-              <a:t>Create users for Jenkins nodes</a:t>
-            </a:r>
-          </a:p>
-          <a:p>
-            <a:pPr marL="342900" indent="-342900">
-              <a:lnSpc>
-                <a:spcPct val="150000"/>
-              </a:lnSpc>
-              <a:buAutoNum type="arabicPeriod"/>
-            </a:pPr>
-            <a:r>
-              <a:rPr lang="en-US" dirty="0"/>
-              <a:t>Put public key for Jenkins users</a:t>
-            </a:r>
-          </a:p>
-          <a:p>
-            <a:pPr marL="342900" indent="-342900">
-              <a:lnSpc>
-                <a:spcPct val="150000"/>
-              </a:lnSpc>
-              <a:buAutoNum type="arabicPeriod"/>
-            </a:pPr>
-            <a:r>
-              <a:rPr lang="en-US" dirty="0"/>
-              <a:t>Install k8s</a:t>
-            </a:r>
-          </a:p>
-          <a:p>
-            <a:pPr marL="342900" indent="-342900">
-              <a:lnSpc>
-                <a:spcPct val="150000"/>
-              </a:lnSpc>
-              <a:buAutoNum type="arabicPeriod"/>
-            </a:pPr>
-            <a:r>
-              <a:rPr lang="en-US" dirty="0"/>
-              <a:t>Install </a:t>
-            </a:r>
-            <a:r>
-              <a:rPr lang="en-US" dirty="0" err="1"/>
-              <a:t>kubectl</a:t>
-            </a:r>
-            <a:endParaRPr lang="en-US" dirty="0"/>
-          </a:p>
-          <a:p>
-            <a:pPr marL="342900" indent="-342900">
-              <a:lnSpc>
-                <a:spcPct val="150000"/>
-              </a:lnSpc>
-              <a:buAutoNum type="arabicPeriod"/>
-            </a:pPr>
-            <a:r>
-              <a:rPr lang="en-US" dirty="0"/>
-              <a:t>Install helm</a:t>
-            </a:r>
-          </a:p>
-          <a:p>
-            <a:pPr>
-              <a:lnSpc>
-                <a:spcPct val="150000"/>
-              </a:lnSpc>
-            </a:pPr>
-            <a:r>
-              <a:rPr lang="en-US" dirty="0"/>
-              <a:t>https://</a:t>
-            </a:r>
-            <a:r>
-              <a:rPr lang="en-US" dirty="0" err="1"/>
-              <a:t>github.com</a:t>
-            </a:r>
-            <a:r>
-              <a:rPr lang="en-US" dirty="0"/>
-              <a:t>/</a:t>
-            </a:r>
-            <a:r>
-              <a:rPr lang="en-US" dirty="0" err="1"/>
-              <a:t>ansokoloff</a:t>
-            </a:r>
-            <a:r>
-              <a:rPr lang="en-US" dirty="0"/>
-              <a:t>/infrastructure/blob/main/</a:t>
-            </a:r>
-            <a:r>
-              <a:rPr lang="en-US" dirty="0" err="1"/>
-              <a:t>global.yaml</a:t>
-            </a:r>
-            <a:endParaRPr lang="ru-UA" dirty="0"/>
-          </a:p>
-        </p:txBody>
-      </p:sp>
-      <p:pic>
-        <p:nvPicPr>
-          <p:cNvPr id="4" name="Рисунок 3" descr="Изображение выглядит как спортивная игра&#10;&#10;Автоматически созданное описание">
-            <a:extLst>
-              <a:ext uri="{FF2B5EF4-FFF2-40B4-BE49-F238E27FC236}">
-                <a16:creationId xmlns:a16="http://schemas.microsoft.com/office/drawing/2014/main" id="{FEF1F0E8-A899-8DF1-6BFB-811E202639E4}"/>
-              </a:ext>
-            </a:extLst>
-          </p:cNvPr>
-          <p:cNvPicPr>
-            <a:picLocks noChangeAspect="1"/>
-          </p:cNvPicPr>
-          <p:nvPr/>
-        </p:nvPicPr>
-        <p:blipFill>
-          <a:blip r:embed="rId2">
-            <a:extLst>
-              <a:ext uri="{28A0092B-C50C-407E-A947-70E740481C1C}">
-                <a14:useLocalDpi xmlns:a14="http://schemas.microsoft.com/office/drawing/2010/main" val="0"/>
-              </a:ext>
-            </a:extLst>
-          </a:blip>
-          <a:stretch>
-            <a:fillRect/>
-          </a:stretch>
-        </p:blipFill>
-        <p:spPr>
-          <a:xfrm>
-            <a:off x="5429757" y="971550"/>
-            <a:ext cx="3409950" cy="3409950"/>
-          </a:xfrm>
-          <a:prstGeom prst="rect">
-            <a:avLst/>
-          </a:prstGeom>
-        </p:spPr>
-      </p:pic>
-    </p:spTree>
-    <p:extLst>
-      <p:ext uri="{BB962C8B-B14F-4D97-AF65-F5344CB8AC3E}">
-        <p14:creationId xmlns:p14="http://schemas.microsoft.com/office/powerpoint/2010/main" val="1047565727"/>
-      </p:ext>
-    </p:extLst>
-  </p:cSld>
-  <p:clrMapOvr>
-    <a:masterClrMapping/>
-  </p:clrMapOvr>
-</p:sld>
-</file>
-
-<file path=ppt/slides/slide7.xml><?xml version="1.0" encoding="utf-8"?>
-<p:sld xmlns:a="http://schemas.openxmlformats.org/drawingml/2006/main" xmlns:r="http://schemas.openxmlformats.org/officeDocument/2006/relationships" xmlns:p="http://schemas.openxmlformats.org/presentationml/2006/main">
-  <p:cSld>
-    <p:spTree>
-      <p:nvGrpSpPr>
-        <p:cNvPr id="1" name=""/>
-        <p:cNvGrpSpPr/>
-        <p:nvPr/>
-      </p:nvGrpSpPr>
-      <p:grpSpPr>
-        <a:xfrm>
-          <a:off x="0" y="0"/>
-          <a:ext cx="0" cy="0"/>
-          <a:chOff x="0" y="0"/>
-          <a:chExt cx="0" cy="0"/>
-        </a:xfrm>
-      </p:grpSpPr>
-      <p:sp>
-        <p:nvSpPr>
-          <p:cNvPr id="3" name="object 3"/>
-          <p:cNvSpPr txBox="1">
-            <a:spLocks noGrp="1"/>
-          </p:cNvSpPr>
-          <p:nvPr>
-            <p:ph type="title"/>
-          </p:nvPr>
-        </p:nvSpPr>
-        <p:spPr>
-          <a:prstGeom prst="rect">
-            <a:avLst/>
-          </a:prstGeom>
-        </p:spPr>
-        <p:txBody>
-          <a:bodyPr vert="horz" wrap="square" lIns="0" tIns="13335" rIns="0" bIns="0" rtlCol="0">
-            <a:spAutoFit/>
-          </a:bodyPr>
-          <a:lstStyle/>
-          <a:p>
-            <a:pPr marL="12700">
-              <a:lnSpc>
-                <a:spcPct val="100000"/>
-              </a:lnSpc>
-              <a:spcBef>
-                <a:spcPts val="105"/>
-              </a:spcBef>
-            </a:pPr>
-            <a:r>
-              <a:rPr lang="en-US" spc="55" dirty="0"/>
-              <a:t>Conclusion</a:t>
-            </a:r>
-            <a:endParaRPr spc="55" dirty="0"/>
-          </a:p>
-        </p:txBody>
-      </p:sp>
-      <p:sp>
-        <p:nvSpPr>
-          <p:cNvPr id="4" name="object 4"/>
-          <p:cNvSpPr txBox="1">
-            <a:spLocks noGrp="1"/>
-          </p:cNvSpPr>
-          <p:nvPr>
-            <p:ph type="sldNum" sz="quarter" idx="7"/>
-          </p:nvPr>
-        </p:nvSpPr>
-        <p:spPr>
-          <a:prstGeom prst="rect">
-            <a:avLst/>
-          </a:prstGeom>
-        </p:spPr>
-        <p:txBody>
-          <a:bodyPr vert="horz" wrap="square" lIns="0" tIns="0" rIns="0" bIns="0" rtlCol="0">
-            <a:spAutoFit/>
-          </a:bodyPr>
-          <a:lstStyle/>
-          <a:p>
-            <a:pPr marL="127635">
-              <a:lnSpc>
-                <a:spcPts val="1435"/>
-              </a:lnSpc>
-            </a:pPr>
-            <a:fld id="{81D60167-4931-47E6-BA6A-407CBD079E47}" type="slidenum">
-              <a:rPr dirty="0"/>
-              <a:t>7</a:t>
-            </a:fld>
-            <a:endParaRPr dirty="0"/>
-          </a:p>
-        </p:txBody>
-      </p:sp>
-      <p:pic>
-        <p:nvPicPr>
-          <p:cNvPr id="5" name="Рисунок 4" descr="Изображение выглядит как текст&#10;&#10;Автоматически созданное описание">
-            <a:extLst>
-              <a:ext uri="{FF2B5EF4-FFF2-40B4-BE49-F238E27FC236}">
-                <a16:creationId xmlns:a16="http://schemas.microsoft.com/office/drawing/2014/main" id="{C9A265C6-6A0F-503C-D64D-A59F4D652ABB}"/>
-              </a:ext>
-            </a:extLst>
-          </p:cNvPr>
-          <p:cNvPicPr>
-            <a:picLocks noChangeAspect="1"/>
-          </p:cNvPicPr>
-          <p:nvPr/>
-        </p:nvPicPr>
-        <p:blipFill>
-          <a:blip r:embed="rId2">
-            <a:extLst>
-              <a:ext uri="{28A0092B-C50C-407E-A947-70E740481C1C}">
-                <a14:useLocalDpi xmlns:a14="http://schemas.microsoft.com/office/drawing/2010/main" val="0"/>
-              </a:ext>
-            </a:extLst>
-          </a:blip>
-          <a:stretch>
-            <a:fillRect/>
-          </a:stretch>
-        </p:blipFill>
-        <p:spPr>
-          <a:xfrm>
-            <a:off x="228600" y="1505821"/>
-            <a:ext cx="2892615" cy="2131857"/>
-          </a:xfrm>
-          <a:prstGeom prst="rect">
-            <a:avLst/>
-          </a:prstGeom>
-        </p:spPr>
-      </p:pic>
-      <p:pic>
-        <p:nvPicPr>
-          <p:cNvPr id="7" name="Рисунок 6" descr="Изображение выглядит как часы&#10;&#10;Автоматически созданное описание">
-            <a:extLst>
-              <a:ext uri="{FF2B5EF4-FFF2-40B4-BE49-F238E27FC236}">
-                <a16:creationId xmlns:a16="http://schemas.microsoft.com/office/drawing/2014/main" id="{C93A9A20-A7CA-C8F2-D07D-287F2508EC81}"/>
-              </a:ext>
-            </a:extLst>
-          </p:cNvPr>
-          <p:cNvPicPr>
-            <a:picLocks noChangeAspect="1"/>
-          </p:cNvPicPr>
-          <p:nvPr/>
-        </p:nvPicPr>
-        <p:blipFill>
-          <a:blip r:embed="rId3">
-            <a:extLst>
-              <a:ext uri="{28A0092B-C50C-407E-A947-70E740481C1C}">
-                <a14:useLocalDpi xmlns:a14="http://schemas.microsoft.com/office/drawing/2010/main" val="0"/>
-              </a:ext>
-            </a:extLst>
-          </a:blip>
-          <a:stretch>
-            <a:fillRect/>
-          </a:stretch>
-        </p:blipFill>
-        <p:spPr>
-          <a:xfrm>
-            <a:off x="2946400" y="946150"/>
-            <a:ext cx="3251200" cy="3251200"/>
-          </a:xfrm>
-          <a:prstGeom prst="rect">
-            <a:avLst/>
-          </a:prstGeom>
-        </p:spPr>
-      </p:pic>
-      <p:pic>
-        <p:nvPicPr>
-          <p:cNvPr id="9" name="Рисунок 8">
-            <a:extLst>
-              <a:ext uri="{FF2B5EF4-FFF2-40B4-BE49-F238E27FC236}">
-                <a16:creationId xmlns:a16="http://schemas.microsoft.com/office/drawing/2014/main" id="{66E36CF6-B29E-B575-C14B-8B7916827C6C}"/>
-              </a:ext>
-            </a:extLst>
-          </p:cNvPr>
-          <p:cNvPicPr>
-            <a:picLocks noChangeAspect="1"/>
-          </p:cNvPicPr>
-          <p:nvPr/>
-        </p:nvPicPr>
-        <p:blipFill>
-          <a:blip r:embed="rId4">
-            <a:extLst>
-              <a:ext uri="{28A0092B-C50C-407E-A947-70E740481C1C}">
-                <a14:useLocalDpi xmlns:a14="http://schemas.microsoft.com/office/drawing/2010/main" val="0"/>
-              </a:ext>
-            </a:extLst>
-          </a:blip>
-          <a:stretch>
-            <a:fillRect/>
-          </a:stretch>
-        </p:blipFill>
-        <p:spPr>
-          <a:xfrm>
-            <a:off x="5514966" y="946150"/>
-            <a:ext cx="3629034" cy="3435350"/>
-          </a:xfrm>
-          <a:prstGeom prst="rect">
-            <a:avLst/>
-          </a:prstGeom>
-        </p:spPr>
-      </p:pic>
-    </p:spTree>
-  </p:cSld>
-  <p:clrMapOvr>
-    <a:masterClrMapping/>
-  </p:clrMapOvr>
-</p:sld>
-</file>
-
-<file path=ppt/slides/slide8.xml><?xml version="1.0" encoding="utf-8"?>
-<p:sld xmlns:a="http://schemas.openxmlformats.org/drawingml/2006/main" xmlns:r="http://schemas.openxmlformats.org/officeDocument/2006/relationships" xmlns:p="http://schemas.openxmlformats.org/presentationml/2006/main" showMasterSp="0">
   <p:cSld>
     <p:spTree>
       <p:nvGrpSpPr>
@@ -6242,7 +5131,7 @@
                 <a:latin typeface="Calibri"/>
                 <a:cs typeface="Calibri"/>
               </a:rPr>
-              <a:t>APPLICATION</a:t>
+              <a:t>INIITIALIZE ENVIRONMENT</a:t>
             </a:r>
           </a:p>
           <a:p>
@@ -6264,7 +5153,1612 @@
     </p:spTree>
     <p:extLst>
       <p:ext uri="{BB962C8B-B14F-4D97-AF65-F5344CB8AC3E}">
-        <p14:creationId xmlns:p14="http://schemas.microsoft.com/office/powerpoint/2010/main" val="3583858188"/>
+        <p14:creationId xmlns:p14="http://schemas.microsoft.com/office/powerpoint/2010/main" val="1584664787"/>
+      </p:ext>
+    </p:extLst>
+  </p:cSld>
+  <p:clrMapOvr>
+    <a:masterClrMapping/>
+  </p:clrMapOvr>
+</p:sld>
+</file>
+
+<file path=ppt/slides/slide5.xml><?xml version="1.0" encoding="utf-8"?>
+<p:sld xmlns:a="http://schemas.openxmlformats.org/drawingml/2006/main" xmlns:r="http://schemas.openxmlformats.org/officeDocument/2006/relationships" xmlns:p="http://schemas.openxmlformats.org/presentationml/2006/main">
+  <p:cSld>
+    <p:spTree>
+      <p:nvGrpSpPr>
+        <p:cNvPr id="1" name=""/>
+        <p:cNvGrpSpPr/>
+        <p:nvPr/>
+      </p:nvGrpSpPr>
+      <p:grpSpPr>
+        <a:xfrm>
+          <a:off x="0" y="0"/>
+          <a:ext cx="0" cy="0"/>
+          <a:chOff x="0" y="0"/>
+          <a:chExt cx="0" cy="0"/>
+        </a:xfrm>
+      </p:grpSpPr>
+      <p:sp>
+        <p:nvSpPr>
+          <p:cNvPr id="2" name="object 2"/>
+          <p:cNvSpPr txBox="1">
+            <a:spLocks noGrp="1"/>
+          </p:cNvSpPr>
+          <p:nvPr>
+            <p:ph type="title"/>
+          </p:nvPr>
+        </p:nvSpPr>
+        <p:spPr>
+          <a:prstGeom prst="rect">
+            <a:avLst/>
+          </a:prstGeom>
+        </p:spPr>
+        <p:txBody>
+          <a:bodyPr vert="horz" wrap="square" lIns="0" tIns="13335" rIns="0" bIns="0" rtlCol="0">
+            <a:spAutoFit/>
+          </a:bodyPr>
+          <a:lstStyle/>
+          <a:p>
+            <a:pPr marL="12700">
+              <a:lnSpc>
+                <a:spcPct val="100000"/>
+              </a:lnSpc>
+              <a:spcBef>
+                <a:spcPts val="105"/>
+              </a:spcBef>
+            </a:pPr>
+            <a:r>
+              <a:rPr lang="en-US" spc="65" dirty="0"/>
+              <a:t>What we are using:</a:t>
+            </a:r>
+            <a:endParaRPr spc="55" dirty="0"/>
+          </a:p>
+        </p:txBody>
+      </p:sp>
+      <p:sp>
+        <p:nvSpPr>
+          <p:cNvPr id="11" name="object 11"/>
+          <p:cNvSpPr txBox="1">
+            <a:spLocks noGrp="1"/>
+          </p:cNvSpPr>
+          <p:nvPr>
+            <p:ph type="sldNum" sz="quarter" idx="7"/>
+          </p:nvPr>
+        </p:nvSpPr>
+        <p:spPr>
+          <a:prstGeom prst="rect">
+            <a:avLst/>
+          </a:prstGeom>
+        </p:spPr>
+        <p:txBody>
+          <a:bodyPr vert="horz" wrap="square" lIns="0" tIns="0" rIns="0" bIns="0" rtlCol="0">
+            <a:spAutoFit/>
+          </a:bodyPr>
+          <a:lstStyle/>
+          <a:p>
+            <a:pPr marL="127635">
+              <a:lnSpc>
+                <a:spcPts val="1435"/>
+              </a:lnSpc>
+            </a:pPr>
+            <a:fld id="{81D60167-4931-47E6-BA6A-407CBD079E47}" type="slidenum">
+              <a:rPr dirty="0"/>
+              <a:t>5</a:t>
+            </a:fld>
+            <a:endParaRPr dirty="0"/>
+          </a:p>
+        </p:txBody>
+      </p:sp>
+      <p:pic>
+        <p:nvPicPr>
+          <p:cNvPr id="15" name="Рисунок 14" descr="Изображение выглядит как текст&#10;&#10;Автоматически созданное описание">
+            <a:extLst>
+              <a:ext uri="{FF2B5EF4-FFF2-40B4-BE49-F238E27FC236}">
+                <a16:creationId xmlns:a16="http://schemas.microsoft.com/office/drawing/2014/main" id="{FFC9045A-F79A-1A7F-1E6F-0D30CDFD5412}"/>
+              </a:ext>
+            </a:extLst>
+          </p:cNvPr>
+          <p:cNvPicPr>
+            <a:picLocks noChangeAspect="1"/>
+          </p:cNvPicPr>
+          <p:nvPr/>
+        </p:nvPicPr>
+        <p:blipFill>
+          <a:blip r:embed="rId2">
+            <a:extLst>
+              <a:ext uri="{28A0092B-C50C-407E-A947-70E740481C1C}">
+                <a14:useLocalDpi xmlns:a14="http://schemas.microsoft.com/office/drawing/2010/main" val="0"/>
+              </a:ext>
+            </a:extLst>
+          </a:blip>
+          <a:stretch>
+            <a:fillRect/>
+          </a:stretch>
+        </p:blipFill>
+        <p:spPr>
+          <a:xfrm>
+            <a:off x="1600200" y="742950"/>
+            <a:ext cx="5475055" cy="4035115"/>
+          </a:xfrm>
+          <a:prstGeom prst="rect">
+            <a:avLst/>
+          </a:prstGeom>
+        </p:spPr>
+      </p:pic>
+    </p:spTree>
+    <p:extLst>
+      <p:ext uri="{BB962C8B-B14F-4D97-AF65-F5344CB8AC3E}">
+        <p14:creationId xmlns:p14="http://schemas.microsoft.com/office/powerpoint/2010/main" val="673124814"/>
+      </p:ext>
+    </p:extLst>
+  </p:cSld>
+  <p:clrMapOvr>
+    <a:masterClrMapping/>
+  </p:clrMapOvr>
+</p:sld>
+</file>
+
+<file path=ppt/slides/slide6.xml><?xml version="1.0" encoding="utf-8"?>
+<p:sld xmlns:a="http://schemas.openxmlformats.org/drawingml/2006/main" xmlns:r="http://schemas.openxmlformats.org/officeDocument/2006/relationships" xmlns:p="http://schemas.openxmlformats.org/presentationml/2006/main">
+  <p:cSld>
+    <p:spTree>
+      <p:nvGrpSpPr>
+        <p:cNvPr id="1" name=""/>
+        <p:cNvGrpSpPr/>
+        <p:nvPr/>
+      </p:nvGrpSpPr>
+      <p:grpSpPr>
+        <a:xfrm>
+          <a:off x="0" y="0"/>
+          <a:ext cx="0" cy="0"/>
+          <a:chOff x="0" y="0"/>
+          <a:chExt cx="0" cy="0"/>
+        </a:xfrm>
+      </p:grpSpPr>
+      <p:pic>
+        <p:nvPicPr>
+          <p:cNvPr id="11" name="Рисунок 10">
+            <a:extLst>
+              <a:ext uri="{FF2B5EF4-FFF2-40B4-BE49-F238E27FC236}">
+                <a16:creationId xmlns:a16="http://schemas.microsoft.com/office/drawing/2014/main" id="{5ACAF87C-641E-5629-FAEB-FBA83EB2DF59}"/>
+              </a:ext>
+            </a:extLst>
+          </p:cNvPr>
+          <p:cNvPicPr>
+            <a:picLocks noChangeAspect="1"/>
+          </p:cNvPicPr>
+          <p:nvPr/>
+        </p:nvPicPr>
+        <p:blipFill>
+          <a:blip r:embed="rId2">
+            <a:extLst>
+              <a:ext uri="{28A0092B-C50C-407E-A947-70E740481C1C}">
+                <a14:useLocalDpi xmlns:a14="http://schemas.microsoft.com/office/drawing/2010/main" val="0"/>
+              </a:ext>
+            </a:extLst>
+          </a:blip>
+          <a:stretch>
+            <a:fillRect/>
+          </a:stretch>
+        </p:blipFill>
+        <p:spPr>
+          <a:xfrm>
+            <a:off x="-2019300" y="-710277"/>
+            <a:ext cx="13186286" cy="6922800"/>
+          </a:xfrm>
+          <a:prstGeom prst="rect">
+            <a:avLst/>
+          </a:prstGeom>
+        </p:spPr>
+      </p:pic>
+      <p:sp>
+        <p:nvSpPr>
+          <p:cNvPr id="2" name="object 2"/>
+          <p:cNvSpPr txBox="1">
+            <a:spLocks noGrp="1"/>
+          </p:cNvSpPr>
+          <p:nvPr>
+            <p:ph type="title"/>
+          </p:nvPr>
+        </p:nvSpPr>
+        <p:spPr>
+          <a:prstGeom prst="rect">
+            <a:avLst/>
+          </a:prstGeom>
+        </p:spPr>
+        <p:txBody>
+          <a:bodyPr vert="horz" wrap="square" lIns="0" tIns="13335" rIns="0" bIns="0" rtlCol="0">
+            <a:spAutoFit/>
+          </a:bodyPr>
+          <a:lstStyle/>
+          <a:p>
+            <a:pPr marL="12700">
+              <a:lnSpc>
+                <a:spcPct val="100000"/>
+              </a:lnSpc>
+              <a:spcBef>
+                <a:spcPts val="105"/>
+              </a:spcBef>
+            </a:pPr>
+            <a:r>
+              <a:rPr lang="en-US" spc="65" dirty="0"/>
+              <a:t>Scheme of environment</a:t>
+            </a:r>
+            <a:endParaRPr spc="60" dirty="0"/>
+          </a:p>
+        </p:txBody>
+      </p:sp>
+      <p:sp>
+        <p:nvSpPr>
+          <p:cNvPr id="4" name="object 4"/>
+          <p:cNvSpPr txBox="1">
+            <a:spLocks noGrp="1"/>
+          </p:cNvSpPr>
+          <p:nvPr>
+            <p:ph type="sldNum" sz="quarter" idx="7"/>
+          </p:nvPr>
+        </p:nvSpPr>
+        <p:spPr>
+          <a:prstGeom prst="rect">
+            <a:avLst/>
+          </a:prstGeom>
+        </p:spPr>
+        <p:txBody>
+          <a:bodyPr vert="horz" wrap="square" lIns="0" tIns="0" rIns="0" bIns="0" rtlCol="0">
+            <a:spAutoFit/>
+          </a:bodyPr>
+          <a:lstStyle/>
+          <a:p>
+            <a:pPr marL="127635">
+              <a:lnSpc>
+                <a:spcPts val="1435"/>
+              </a:lnSpc>
+            </a:pPr>
+            <a:fld id="{81D60167-4931-47E6-BA6A-407CBD079E47}" type="slidenum">
+              <a:rPr dirty="0"/>
+              <a:t>6</a:t>
+            </a:fld>
+            <a:endParaRPr dirty="0"/>
+          </a:p>
+        </p:txBody>
+      </p:sp>
+      <p:pic>
+        <p:nvPicPr>
+          <p:cNvPr id="6" name="Рисунок 5">
+            <a:extLst>
+              <a:ext uri="{FF2B5EF4-FFF2-40B4-BE49-F238E27FC236}">
+                <a16:creationId xmlns:a16="http://schemas.microsoft.com/office/drawing/2014/main" id="{3573A994-65D3-8C21-1245-454B095A4E94}"/>
+              </a:ext>
+            </a:extLst>
+          </p:cNvPr>
+          <p:cNvPicPr>
+            <a:picLocks noChangeAspect="1"/>
+          </p:cNvPicPr>
+          <p:nvPr/>
+        </p:nvPicPr>
+        <p:blipFill>
+          <a:blip r:embed="rId3">
+            <a:extLst>
+              <a:ext uri="{28A0092B-C50C-407E-A947-70E740481C1C}">
+                <a14:useLocalDpi xmlns:a14="http://schemas.microsoft.com/office/drawing/2010/main" val="0"/>
+              </a:ext>
+            </a:extLst>
+          </a:blip>
+          <a:stretch>
+            <a:fillRect/>
+          </a:stretch>
+        </p:blipFill>
+        <p:spPr>
+          <a:xfrm>
+            <a:off x="1447800" y="1085663"/>
+            <a:ext cx="1397000" cy="1512094"/>
+          </a:xfrm>
+          <a:prstGeom prst="rect">
+            <a:avLst/>
+          </a:prstGeom>
+        </p:spPr>
+      </p:pic>
+      <p:pic>
+        <p:nvPicPr>
+          <p:cNvPr id="7" name="Рисунок 6">
+            <a:extLst>
+              <a:ext uri="{FF2B5EF4-FFF2-40B4-BE49-F238E27FC236}">
+                <a16:creationId xmlns:a16="http://schemas.microsoft.com/office/drawing/2014/main" id="{F24EA1BA-27E0-CED0-0CC9-CFCD0E7143B0}"/>
+              </a:ext>
+            </a:extLst>
+          </p:cNvPr>
+          <p:cNvPicPr>
+            <a:picLocks noChangeAspect="1"/>
+          </p:cNvPicPr>
+          <p:nvPr/>
+        </p:nvPicPr>
+        <p:blipFill>
+          <a:blip r:embed="rId3">
+            <a:extLst>
+              <a:ext uri="{28A0092B-C50C-407E-A947-70E740481C1C}">
+                <a14:useLocalDpi xmlns:a14="http://schemas.microsoft.com/office/drawing/2010/main" val="0"/>
+              </a:ext>
+            </a:extLst>
+          </a:blip>
+          <a:stretch>
+            <a:fillRect/>
+          </a:stretch>
+        </p:blipFill>
+        <p:spPr>
+          <a:xfrm>
+            <a:off x="1600200" y="1238063"/>
+            <a:ext cx="1397000" cy="1512094"/>
+          </a:xfrm>
+          <a:prstGeom prst="rect">
+            <a:avLst/>
+          </a:prstGeom>
+        </p:spPr>
+      </p:pic>
+      <p:pic>
+        <p:nvPicPr>
+          <p:cNvPr id="8" name="Рисунок 7">
+            <a:extLst>
+              <a:ext uri="{FF2B5EF4-FFF2-40B4-BE49-F238E27FC236}">
+                <a16:creationId xmlns:a16="http://schemas.microsoft.com/office/drawing/2014/main" id="{362DC504-CFBD-0014-2715-4793E212CC96}"/>
+              </a:ext>
+            </a:extLst>
+          </p:cNvPr>
+          <p:cNvPicPr>
+            <a:picLocks noChangeAspect="1"/>
+          </p:cNvPicPr>
+          <p:nvPr/>
+        </p:nvPicPr>
+        <p:blipFill>
+          <a:blip r:embed="rId3">
+            <a:extLst>
+              <a:ext uri="{28A0092B-C50C-407E-A947-70E740481C1C}">
+                <a14:useLocalDpi xmlns:a14="http://schemas.microsoft.com/office/drawing/2010/main" val="0"/>
+              </a:ext>
+            </a:extLst>
+          </a:blip>
+          <a:stretch>
+            <a:fillRect/>
+          </a:stretch>
+        </p:blipFill>
+        <p:spPr>
+          <a:xfrm>
+            <a:off x="6019800" y="1059656"/>
+            <a:ext cx="1397000" cy="1512094"/>
+          </a:xfrm>
+          <a:prstGeom prst="rect">
+            <a:avLst/>
+          </a:prstGeom>
+        </p:spPr>
+      </p:pic>
+      <p:pic>
+        <p:nvPicPr>
+          <p:cNvPr id="9" name="Рисунок 8">
+            <a:extLst>
+              <a:ext uri="{FF2B5EF4-FFF2-40B4-BE49-F238E27FC236}">
+                <a16:creationId xmlns:a16="http://schemas.microsoft.com/office/drawing/2014/main" id="{42C97718-175F-9343-9B10-099A9DADC24E}"/>
+              </a:ext>
+            </a:extLst>
+          </p:cNvPr>
+          <p:cNvPicPr>
+            <a:picLocks noChangeAspect="1"/>
+          </p:cNvPicPr>
+          <p:nvPr/>
+        </p:nvPicPr>
+        <p:blipFill>
+          <a:blip r:embed="rId3">
+            <a:extLst>
+              <a:ext uri="{28A0092B-C50C-407E-A947-70E740481C1C}">
+                <a14:useLocalDpi xmlns:a14="http://schemas.microsoft.com/office/drawing/2010/main" val="0"/>
+              </a:ext>
+            </a:extLst>
+          </a:blip>
+          <a:stretch>
+            <a:fillRect/>
+          </a:stretch>
+        </p:blipFill>
+        <p:spPr>
+          <a:xfrm>
+            <a:off x="3569550" y="3105150"/>
+            <a:ext cx="1397000" cy="1512094"/>
+          </a:xfrm>
+          <a:prstGeom prst="rect">
+            <a:avLst/>
+          </a:prstGeom>
+        </p:spPr>
+      </p:pic>
+      <p:pic>
+        <p:nvPicPr>
+          <p:cNvPr id="13" name="Рисунок 12">
+            <a:extLst>
+              <a:ext uri="{FF2B5EF4-FFF2-40B4-BE49-F238E27FC236}">
+                <a16:creationId xmlns:a16="http://schemas.microsoft.com/office/drawing/2014/main" id="{FD2245EC-CAF1-403B-7177-79AEC2371BF5}"/>
+              </a:ext>
+            </a:extLst>
+          </p:cNvPr>
+          <p:cNvPicPr>
+            <a:picLocks noChangeAspect="1"/>
+          </p:cNvPicPr>
+          <p:nvPr/>
+        </p:nvPicPr>
+        <p:blipFill>
+          <a:blip r:embed="rId4">
+            <a:extLst>
+              <a:ext uri="{28A0092B-C50C-407E-A947-70E740481C1C}">
+                <a14:useLocalDpi xmlns:a14="http://schemas.microsoft.com/office/drawing/2010/main" val="0"/>
+              </a:ext>
+            </a:extLst>
+          </a:blip>
+          <a:stretch>
+            <a:fillRect/>
+          </a:stretch>
+        </p:blipFill>
+        <p:spPr>
+          <a:xfrm>
+            <a:off x="736166" y="883413"/>
+            <a:ext cx="896502" cy="498923"/>
+          </a:xfrm>
+          <a:prstGeom prst="rect">
+            <a:avLst/>
+          </a:prstGeom>
+        </p:spPr>
+      </p:pic>
+      <p:pic>
+        <p:nvPicPr>
+          <p:cNvPr id="15" name="Рисунок 14">
+            <a:extLst>
+              <a:ext uri="{FF2B5EF4-FFF2-40B4-BE49-F238E27FC236}">
+                <a16:creationId xmlns:a16="http://schemas.microsoft.com/office/drawing/2014/main" id="{0CAF55CC-5974-3D14-57D3-6C10B682BDBF}"/>
+              </a:ext>
+            </a:extLst>
+          </p:cNvPr>
+          <p:cNvPicPr>
+            <a:picLocks noChangeAspect="1"/>
+          </p:cNvPicPr>
+          <p:nvPr/>
+        </p:nvPicPr>
+        <p:blipFill>
+          <a:blip r:embed="rId5">
+            <a:extLst>
+              <a:ext uri="{28A0092B-C50C-407E-A947-70E740481C1C}">
+                <a14:useLocalDpi xmlns:a14="http://schemas.microsoft.com/office/drawing/2010/main" val="0"/>
+              </a:ext>
+            </a:extLst>
+          </a:blip>
+          <a:stretch>
+            <a:fillRect/>
+          </a:stretch>
+        </p:blipFill>
+        <p:spPr>
+          <a:xfrm>
+            <a:off x="779145" y="1414032"/>
+            <a:ext cx="744855" cy="526256"/>
+          </a:xfrm>
+          <a:prstGeom prst="rect">
+            <a:avLst/>
+          </a:prstGeom>
+        </p:spPr>
+      </p:pic>
+      <p:pic>
+        <p:nvPicPr>
+          <p:cNvPr id="17" name="Рисунок 16">
+            <a:extLst>
+              <a:ext uri="{FF2B5EF4-FFF2-40B4-BE49-F238E27FC236}">
+                <a16:creationId xmlns:a16="http://schemas.microsoft.com/office/drawing/2014/main" id="{B2729C72-EE02-37C6-9201-E3E3CF9B9E92}"/>
+              </a:ext>
+            </a:extLst>
+          </p:cNvPr>
+          <p:cNvPicPr>
+            <a:picLocks noChangeAspect="1"/>
+          </p:cNvPicPr>
+          <p:nvPr/>
+        </p:nvPicPr>
+        <p:blipFill>
+          <a:blip r:embed="rId6">
+            <a:extLst>
+              <a:ext uri="{28A0092B-C50C-407E-A947-70E740481C1C}">
+                <a14:useLocalDpi xmlns:a14="http://schemas.microsoft.com/office/drawing/2010/main" val="0"/>
+              </a:ext>
+              <a:ext uri="{96DAC541-7B7A-43D3-8B79-37D633B846F1}">
+                <asvg:svgBlip xmlns:asvg="http://schemas.microsoft.com/office/drawing/2016/SVG/main" r:embed="rId7"/>
+              </a:ext>
+            </a:extLst>
+          </a:blip>
+          <a:stretch>
+            <a:fillRect/>
+          </a:stretch>
+        </p:blipFill>
+        <p:spPr>
+          <a:xfrm>
+            <a:off x="802410" y="1961404"/>
+            <a:ext cx="531023" cy="590550"/>
+          </a:xfrm>
+          <a:prstGeom prst="rect">
+            <a:avLst/>
+          </a:prstGeom>
+        </p:spPr>
+      </p:pic>
+      <p:pic>
+        <p:nvPicPr>
+          <p:cNvPr id="19" name="Рисунок 18">
+            <a:extLst>
+              <a:ext uri="{FF2B5EF4-FFF2-40B4-BE49-F238E27FC236}">
+                <a16:creationId xmlns:a16="http://schemas.microsoft.com/office/drawing/2014/main" id="{BDAB027D-AB1C-1EC3-9F2E-FF0EE7E80090}"/>
+              </a:ext>
+            </a:extLst>
+          </p:cNvPr>
+          <p:cNvPicPr>
+            <a:picLocks noChangeAspect="1"/>
+          </p:cNvPicPr>
+          <p:nvPr/>
+        </p:nvPicPr>
+        <p:blipFill>
+          <a:blip r:embed="rId8">
+            <a:extLst>
+              <a:ext uri="{28A0092B-C50C-407E-A947-70E740481C1C}">
+                <a14:useLocalDpi xmlns:a14="http://schemas.microsoft.com/office/drawing/2010/main" val="0"/>
+              </a:ext>
+              <a:ext uri="{96DAC541-7B7A-43D3-8B79-37D633B846F1}">
+                <asvg:svgBlip xmlns:asvg="http://schemas.microsoft.com/office/drawing/2016/SVG/main" r:embed="rId9"/>
+              </a:ext>
+            </a:extLst>
+          </a:blip>
+          <a:stretch>
+            <a:fillRect/>
+          </a:stretch>
+        </p:blipFill>
+        <p:spPr>
+          <a:xfrm>
+            <a:off x="802410" y="2621152"/>
+            <a:ext cx="579577" cy="582061"/>
+          </a:xfrm>
+          <a:prstGeom prst="rect">
+            <a:avLst/>
+          </a:prstGeom>
+        </p:spPr>
+      </p:pic>
+      <p:sp>
+        <p:nvSpPr>
+          <p:cNvPr id="20" name="TextBox 19">
+            <a:extLst>
+              <a:ext uri="{FF2B5EF4-FFF2-40B4-BE49-F238E27FC236}">
+                <a16:creationId xmlns:a16="http://schemas.microsoft.com/office/drawing/2014/main" id="{B389A69D-87D0-355F-83CD-32BEF7530D6B}"/>
+              </a:ext>
+            </a:extLst>
+          </p:cNvPr>
+          <p:cNvSpPr txBox="1"/>
+          <p:nvPr/>
+        </p:nvSpPr>
+        <p:spPr>
+          <a:xfrm>
+            <a:off x="1741115" y="868731"/>
+            <a:ext cx="889987" cy="369332"/>
+          </a:xfrm>
+          <a:prstGeom prst="rect">
+            <a:avLst/>
+          </a:prstGeom>
+          <a:noFill/>
+        </p:spPr>
+        <p:txBody>
+          <a:bodyPr wrap="none" rtlCol="0">
+            <a:spAutoFit/>
+          </a:bodyPr>
+          <a:lstStyle/>
+          <a:p>
+            <a:r>
+              <a:rPr lang="en-US" dirty="0"/>
+              <a:t>Master</a:t>
+            </a:r>
+            <a:endParaRPr lang="ru-UA" dirty="0"/>
+          </a:p>
+        </p:txBody>
+      </p:sp>
+      <p:sp>
+        <p:nvSpPr>
+          <p:cNvPr id="21" name="TextBox 20">
+            <a:extLst>
+              <a:ext uri="{FF2B5EF4-FFF2-40B4-BE49-F238E27FC236}">
+                <a16:creationId xmlns:a16="http://schemas.microsoft.com/office/drawing/2014/main" id="{5FA72601-DE1E-19A0-CEBF-A231886D1D97}"/>
+              </a:ext>
+            </a:extLst>
+          </p:cNvPr>
+          <p:cNvSpPr txBox="1"/>
+          <p:nvPr/>
+        </p:nvSpPr>
+        <p:spPr>
+          <a:xfrm>
+            <a:off x="4015437" y="2833881"/>
+            <a:ext cx="556563" cy="369332"/>
+          </a:xfrm>
+          <a:prstGeom prst="rect">
+            <a:avLst/>
+          </a:prstGeom>
+          <a:noFill/>
+        </p:spPr>
+        <p:txBody>
+          <a:bodyPr wrap="none" rtlCol="0">
+            <a:spAutoFit/>
+          </a:bodyPr>
+          <a:lstStyle/>
+          <a:p>
+            <a:r>
+              <a:rPr lang="en-US" dirty="0"/>
+              <a:t>dev</a:t>
+            </a:r>
+            <a:endParaRPr lang="ru-UA" dirty="0"/>
+          </a:p>
+        </p:txBody>
+      </p:sp>
+      <p:sp>
+        <p:nvSpPr>
+          <p:cNvPr id="22" name="TextBox 21">
+            <a:extLst>
+              <a:ext uri="{FF2B5EF4-FFF2-40B4-BE49-F238E27FC236}">
+                <a16:creationId xmlns:a16="http://schemas.microsoft.com/office/drawing/2014/main" id="{D15E4A6B-DE4E-6C38-B17E-CA2E61716DDD}"/>
+              </a:ext>
+            </a:extLst>
+          </p:cNvPr>
+          <p:cNvSpPr txBox="1"/>
+          <p:nvPr/>
+        </p:nvSpPr>
+        <p:spPr>
+          <a:xfrm>
+            <a:off x="6311900" y="781483"/>
+            <a:ext cx="800219" cy="369332"/>
+          </a:xfrm>
+          <a:prstGeom prst="rect">
+            <a:avLst/>
+          </a:prstGeom>
+          <a:noFill/>
+        </p:spPr>
+        <p:txBody>
+          <a:bodyPr wrap="none" rtlCol="0">
+            <a:spAutoFit/>
+          </a:bodyPr>
+          <a:lstStyle/>
+          <a:p>
+            <a:r>
+              <a:rPr lang="en-US" dirty="0" err="1"/>
+              <a:t>Kuber</a:t>
+            </a:r>
+            <a:endParaRPr lang="ru-UA" dirty="0"/>
+          </a:p>
+        </p:txBody>
+      </p:sp>
+      <p:pic>
+        <p:nvPicPr>
+          <p:cNvPr id="23" name="Рисунок 22">
+            <a:extLst>
+              <a:ext uri="{FF2B5EF4-FFF2-40B4-BE49-F238E27FC236}">
+                <a16:creationId xmlns:a16="http://schemas.microsoft.com/office/drawing/2014/main" id="{1D30EF66-F9B0-EF59-F653-7FD469825451}"/>
+              </a:ext>
+            </a:extLst>
+          </p:cNvPr>
+          <p:cNvPicPr>
+            <a:picLocks noChangeAspect="1"/>
+          </p:cNvPicPr>
+          <p:nvPr/>
+        </p:nvPicPr>
+        <p:blipFill>
+          <a:blip r:embed="rId5">
+            <a:extLst>
+              <a:ext uri="{28A0092B-C50C-407E-A947-70E740481C1C}">
+                <a14:useLocalDpi xmlns:a14="http://schemas.microsoft.com/office/drawing/2010/main" val="0"/>
+              </a:ext>
+            </a:extLst>
+          </a:blip>
+          <a:stretch>
+            <a:fillRect/>
+          </a:stretch>
+        </p:blipFill>
+        <p:spPr>
+          <a:xfrm>
+            <a:off x="4791398" y="3184318"/>
+            <a:ext cx="744855" cy="526256"/>
+          </a:xfrm>
+          <a:prstGeom prst="rect">
+            <a:avLst/>
+          </a:prstGeom>
+        </p:spPr>
+      </p:pic>
+      <p:pic>
+        <p:nvPicPr>
+          <p:cNvPr id="24" name="Рисунок 23">
+            <a:extLst>
+              <a:ext uri="{FF2B5EF4-FFF2-40B4-BE49-F238E27FC236}">
+                <a16:creationId xmlns:a16="http://schemas.microsoft.com/office/drawing/2014/main" id="{5398EF64-37FE-93FB-5EEC-A182F390EB0D}"/>
+              </a:ext>
+            </a:extLst>
+          </p:cNvPr>
+          <p:cNvPicPr>
+            <a:picLocks noChangeAspect="1"/>
+          </p:cNvPicPr>
+          <p:nvPr/>
+        </p:nvPicPr>
+        <p:blipFill>
+          <a:blip r:embed="rId5">
+            <a:extLst>
+              <a:ext uri="{28A0092B-C50C-407E-A947-70E740481C1C}">
+                <a14:useLocalDpi xmlns:a14="http://schemas.microsoft.com/office/drawing/2010/main" val="0"/>
+              </a:ext>
+            </a:extLst>
+          </a:blip>
+          <a:stretch>
+            <a:fillRect/>
+          </a:stretch>
+        </p:blipFill>
+        <p:spPr>
+          <a:xfrm>
+            <a:off x="7381586" y="3959540"/>
+            <a:ext cx="744855" cy="526256"/>
+          </a:xfrm>
+          <a:prstGeom prst="rect">
+            <a:avLst/>
+          </a:prstGeom>
+        </p:spPr>
+      </p:pic>
+      <p:pic>
+        <p:nvPicPr>
+          <p:cNvPr id="26" name="Рисунок 25">
+            <a:extLst>
+              <a:ext uri="{FF2B5EF4-FFF2-40B4-BE49-F238E27FC236}">
+                <a16:creationId xmlns:a16="http://schemas.microsoft.com/office/drawing/2014/main" id="{3E7D4BC0-330F-3E2A-FD65-23059063A2AB}"/>
+              </a:ext>
+            </a:extLst>
+          </p:cNvPr>
+          <p:cNvPicPr>
+            <a:picLocks noChangeAspect="1"/>
+          </p:cNvPicPr>
+          <p:nvPr/>
+        </p:nvPicPr>
+        <p:blipFill>
+          <a:blip r:embed="rId10">
+            <a:extLst>
+              <a:ext uri="{28A0092B-C50C-407E-A947-70E740481C1C}">
+                <a14:useLocalDpi xmlns:a14="http://schemas.microsoft.com/office/drawing/2010/main" val="0"/>
+              </a:ext>
+            </a:extLst>
+          </a:blip>
+          <a:stretch>
+            <a:fillRect/>
+          </a:stretch>
+        </p:blipFill>
+        <p:spPr>
+          <a:xfrm>
+            <a:off x="7410328" y="1382336"/>
+            <a:ext cx="542671" cy="526256"/>
+          </a:xfrm>
+          <a:prstGeom prst="rect">
+            <a:avLst/>
+          </a:prstGeom>
+        </p:spPr>
+      </p:pic>
+      <p:pic>
+        <p:nvPicPr>
+          <p:cNvPr id="28" name="Рисунок 27">
+            <a:extLst>
+              <a:ext uri="{FF2B5EF4-FFF2-40B4-BE49-F238E27FC236}">
+                <a16:creationId xmlns:a16="http://schemas.microsoft.com/office/drawing/2014/main" id="{57BCCBC6-964C-3DFF-6B66-EA3B87589A94}"/>
+              </a:ext>
+            </a:extLst>
+          </p:cNvPr>
+          <p:cNvPicPr>
+            <a:picLocks noChangeAspect="1"/>
+          </p:cNvPicPr>
+          <p:nvPr/>
+        </p:nvPicPr>
+        <p:blipFill>
+          <a:blip r:embed="rId11">
+            <a:extLst>
+              <a:ext uri="{28A0092B-C50C-407E-A947-70E740481C1C}">
+                <a14:useLocalDpi xmlns:a14="http://schemas.microsoft.com/office/drawing/2010/main" val="0"/>
+              </a:ext>
+              <a:ext uri="{96DAC541-7B7A-43D3-8B79-37D633B846F1}">
+                <asvg:svgBlip xmlns:asvg="http://schemas.microsoft.com/office/drawing/2016/SVG/main" r:embed="rId12"/>
+              </a:ext>
+            </a:extLst>
+          </a:blip>
+          <a:stretch>
+            <a:fillRect/>
+          </a:stretch>
+        </p:blipFill>
+        <p:spPr>
+          <a:xfrm>
+            <a:off x="7381586" y="1956016"/>
+            <a:ext cx="629228" cy="725820"/>
+          </a:xfrm>
+          <a:prstGeom prst="rect">
+            <a:avLst/>
+          </a:prstGeom>
+        </p:spPr>
+      </p:pic>
+      <p:pic>
+        <p:nvPicPr>
+          <p:cNvPr id="29" name="Рисунок 28">
+            <a:extLst>
+              <a:ext uri="{FF2B5EF4-FFF2-40B4-BE49-F238E27FC236}">
+                <a16:creationId xmlns:a16="http://schemas.microsoft.com/office/drawing/2014/main" id="{F889C6C0-8F7A-A199-F4F5-EB773A101EA5}"/>
+              </a:ext>
+            </a:extLst>
+          </p:cNvPr>
+          <p:cNvPicPr>
+            <a:picLocks noChangeAspect="1"/>
+          </p:cNvPicPr>
+          <p:nvPr/>
+        </p:nvPicPr>
+        <p:blipFill>
+          <a:blip r:embed="rId8">
+            <a:extLst>
+              <a:ext uri="{28A0092B-C50C-407E-A947-70E740481C1C}">
+                <a14:useLocalDpi xmlns:a14="http://schemas.microsoft.com/office/drawing/2010/main" val="0"/>
+              </a:ext>
+              <a:ext uri="{96DAC541-7B7A-43D3-8B79-37D633B846F1}">
+                <asvg:svgBlip xmlns:asvg="http://schemas.microsoft.com/office/drawing/2016/SVG/main" r:embed="rId9"/>
+              </a:ext>
+            </a:extLst>
+          </a:blip>
+          <a:stretch>
+            <a:fillRect/>
+          </a:stretch>
+        </p:blipFill>
+        <p:spPr>
+          <a:xfrm>
+            <a:off x="7394677" y="2750157"/>
+            <a:ext cx="579577" cy="582061"/>
+          </a:xfrm>
+          <a:prstGeom prst="rect">
+            <a:avLst/>
+          </a:prstGeom>
+        </p:spPr>
+      </p:pic>
+      <p:pic>
+        <p:nvPicPr>
+          <p:cNvPr id="31" name="Рисунок 30">
+            <a:extLst>
+              <a:ext uri="{FF2B5EF4-FFF2-40B4-BE49-F238E27FC236}">
+                <a16:creationId xmlns:a16="http://schemas.microsoft.com/office/drawing/2014/main" id="{519EED90-36E7-190A-0245-F347829D2808}"/>
+              </a:ext>
+            </a:extLst>
+          </p:cNvPr>
+          <p:cNvPicPr>
+            <a:picLocks noChangeAspect="1"/>
+          </p:cNvPicPr>
+          <p:nvPr/>
+        </p:nvPicPr>
+        <p:blipFill>
+          <a:blip r:embed="rId13">
+            <a:extLst>
+              <a:ext uri="{28A0092B-C50C-407E-A947-70E740481C1C}">
+                <a14:useLocalDpi xmlns:a14="http://schemas.microsoft.com/office/drawing/2010/main" val="0"/>
+              </a:ext>
+            </a:extLst>
+          </a:blip>
+          <a:stretch>
+            <a:fillRect/>
+          </a:stretch>
+        </p:blipFill>
+        <p:spPr>
+          <a:xfrm>
+            <a:off x="823446" y="3272411"/>
+            <a:ext cx="488950" cy="488950"/>
+          </a:xfrm>
+          <a:prstGeom prst="rect">
+            <a:avLst/>
+          </a:prstGeom>
+        </p:spPr>
+      </p:pic>
+      <p:pic>
+        <p:nvPicPr>
+          <p:cNvPr id="32" name="Рисунок 31">
+            <a:extLst>
+              <a:ext uri="{FF2B5EF4-FFF2-40B4-BE49-F238E27FC236}">
+                <a16:creationId xmlns:a16="http://schemas.microsoft.com/office/drawing/2014/main" id="{DE63E139-CB4E-0523-921D-A01D4ED9A86B}"/>
+              </a:ext>
+            </a:extLst>
+          </p:cNvPr>
+          <p:cNvPicPr>
+            <a:picLocks noChangeAspect="1"/>
+          </p:cNvPicPr>
+          <p:nvPr/>
+        </p:nvPicPr>
+        <p:blipFill>
+          <a:blip r:embed="rId13">
+            <a:extLst>
+              <a:ext uri="{28A0092B-C50C-407E-A947-70E740481C1C}">
+                <a14:useLocalDpi xmlns:a14="http://schemas.microsoft.com/office/drawing/2010/main" val="0"/>
+              </a:ext>
+            </a:extLst>
+          </a:blip>
+          <a:stretch>
+            <a:fillRect/>
+          </a:stretch>
+        </p:blipFill>
+        <p:spPr>
+          <a:xfrm>
+            <a:off x="7451724" y="3416417"/>
+            <a:ext cx="488950" cy="488950"/>
+          </a:xfrm>
+          <a:prstGeom prst="rect">
+            <a:avLst/>
+          </a:prstGeom>
+        </p:spPr>
+      </p:pic>
+      <p:pic>
+        <p:nvPicPr>
+          <p:cNvPr id="34" name="Рисунок 33">
+            <a:extLst>
+              <a:ext uri="{FF2B5EF4-FFF2-40B4-BE49-F238E27FC236}">
+                <a16:creationId xmlns:a16="http://schemas.microsoft.com/office/drawing/2014/main" id="{25366365-8590-C9F8-A4DE-0BD646058237}"/>
+              </a:ext>
+            </a:extLst>
+          </p:cNvPr>
+          <p:cNvPicPr>
+            <a:picLocks noChangeAspect="1"/>
+          </p:cNvPicPr>
+          <p:nvPr/>
+        </p:nvPicPr>
+        <p:blipFill>
+          <a:blip r:embed="rId14">
+            <a:extLst>
+              <a:ext uri="{28A0092B-C50C-407E-A947-70E740481C1C}">
+                <a14:useLocalDpi xmlns:a14="http://schemas.microsoft.com/office/drawing/2010/main" val="0"/>
+              </a:ext>
+            </a:extLst>
+          </a:blip>
+          <a:stretch>
+            <a:fillRect/>
+          </a:stretch>
+        </p:blipFill>
+        <p:spPr>
+          <a:xfrm>
+            <a:off x="7377256" y="726614"/>
+            <a:ext cx="608814" cy="590550"/>
+          </a:xfrm>
+          <a:prstGeom prst="rect">
+            <a:avLst/>
+          </a:prstGeom>
+        </p:spPr>
+      </p:pic>
+      <p:pic>
+        <p:nvPicPr>
+          <p:cNvPr id="35" name="Рисунок 34">
+            <a:extLst>
+              <a:ext uri="{FF2B5EF4-FFF2-40B4-BE49-F238E27FC236}">
+                <a16:creationId xmlns:a16="http://schemas.microsoft.com/office/drawing/2014/main" id="{0B66D39F-6216-8FC8-3342-4BABD5D8BACC}"/>
+              </a:ext>
+            </a:extLst>
+          </p:cNvPr>
+          <p:cNvPicPr>
+            <a:picLocks noChangeAspect="1"/>
+          </p:cNvPicPr>
+          <p:nvPr/>
+        </p:nvPicPr>
+        <p:blipFill>
+          <a:blip r:embed="rId4">
+            <a:extLst>
+              <a:ext uri="{28A0092B-C50C-407E-A947-70E740481C1C}">
+                <a14:useLocalDpi xmlns:a14="http://schemas.microsoft.com/office/drawing/2010/main" val="0"/>
+              </a:ext>
+            </a:extLst>
+          </a:blip>
+          <a:stretch>
+            <a:fillRect/>
+          </a:stretch>
+        </p:blipFill>
+        <p:spPr>
+          <a:xfrm>
+            <a:off x="4730226" y="2681836"/>
+            <a:ext cx="896502" cy="498923"/>
+          </a:xfrm>
+          <a:prstGeom prst="rect">
+            <a:avLst/>
+          </a:prstGeom>
+        </p:spPr>
+      </p:pic>
+      <p:pic>
+        <p:nvPicPr>
+          <p:cNvPr id="36" name="Рисунок 35">
+            <a:extLst>
+              <a:ext uri="{FF2B5EF4-FFF2-40B4-BE49-F238E27FC236}">
+                <a16:creationId xmlns:a16="http://schemas.microsoft.com/office/drawing/2014/main" id="{1F18D5B9-4637-E214-0437-FDA7DC60AE95}"/>
+              </a:ext>
+            </a:extLst>
+          </p:cNvPr>
+          <p:cNvPicPr>
+            <a:picLocks noChangeAspect="1"/>
+          </p:cNvPicPr>
+          <p:nvPr/>
+        </p:nvPicPr>
+        <p:blipFill>
+          <a:blip r:embed="rId4">
+            <a:extLst>
+              <a:ext uri="{28A0092B-C50C-407E-A947-70E740481C1C}">
+                <a14:useLocalDpi xmlns:a14="http://schemas.microsoft.com/office/drawing/2010/main" val="0"/>
+              </a:ext>
+            </a:extLst>
+          </a:blip>
+          <a:stretch>
+            <a:fillRect/>
+          </a:stretch>
+        </p:blipFill>
+        <p:spPr>
+          <a:xfrm>
+            <a:off x="7305762" y="4490680"/>
+            <a:ext cx="896502" cy="498923"/>
+          </a:xfrm>
+          <a:prstGeom prst="rect">
+            <a:avLst/>
+          </a:prstGeom>
+        </p:spPr>
+      </p:pic>
+    </p:spTree>
+  </p:cSld>
+  <p:clrMapOvr>
+    <a:masterClrMapping/>
+  </p:clrMapOvr>
+</p:sld>
+</file>
+
+<file path=ppt/slides/slide7.xml><?xml version="1.0" encoding="utf-8"?>
+<p:sld xmlns:a="http://schemas.openxmlformats.org/drawingml/2006/main" xmlns:r="http://schemas.openxmlformats.org/officeDocument/2006/relationships" xmlns:p="http://schemas.openxmlformats.org/presentationml/2006/main">
+  <p:cSld>
+    <p:spTree>
+      <p:nvGrpSpPr>
+        <p:cNvPr id="1" name=""/>
+        <p:cNvGrpSpPr/>
+        <p:nvPr/>
+      </p:nvGrpSpPr>
+      <p:grpSpPr>
+        <a:xfrm>
+          <a:off x="0" y="0"/>
+          <a:ext cx="0" cy="0"/>
+          <a:chOff x="0" y="0"/>
+          <a:chExt cx="0" cy="0"/>
+        </a:xfrm>
+      </p:grpSpPr>
+      <p:sp>
+        <p:nvSpPr>
+          <p:cNvPr id="2" name="object 2"/>
+          <p:cNvSpPr txBox="1">
+            <a:spLocks noGrp="1"/>
+          </p:cNvSpPr>
+          <p:nvPr>
+            <p:ph type="title"/>
+          </p:nvPr>
+        </p:nvSpPr>
+        <p:spPr>
+          <a:prstGeom prst="rect">
+            <a:avLst/>
+          </a:prstGeom>
+        </p:spPr>
+        <p:txBody>
+          <a:bodyPr vert="horz" wrap="square" lIns="0" tIns="13335" rIns="0" bIns="0" rtlCol="0">
+            <a:spAutoFit/>
+          </a:bodyPr>
+          <a:lstStyle/>
+          <a:p>
+            <a:pPr marL="12700">
+              <a:lnSpc>
+                <a:spcPct val="100000"/>
+              </a:lnSpc>
+              <a:spcBef>
+                <a:spcPts val="105"/>
+              </a:spcBef>
+            </a:pPr>
+            <a:r>
+              <a:rPr lang="en-US" spc="55" dirty="0" err="1"/>
+              <a:t>Terraform’s</a:t>
+            </a:r>
+            <a:r>
+              <a:rPr lang="en-US" spc="55" dirty="0"/>
+              <a:t> objectives</a:t>
+            </a:r>
+            <a:endParaRPr spc="55" dirty="0"/>
+          </a:p>
+        </p:txBody>
+      </p:sp>
+      <p:sp>
+        <p:nvSpPr>
+          <p:cNvPr id="5" name="object 5"/>
+          <p:cNvSpPr txBox="1">
+            <a:spLocks noGrp="1"/>
+          </p:cNvSpPr>
+          <p:nvPr>
+            <p:ph type="sldNum" sz="quarter" idx="7"/>
+          </p:nvPr>
+        </p:nvSpPr>
+        <p:spPr>
+          <a:prstGeom prst="rect">
+            <a:avLst/>
+          </a:prstGeom>
+        </p:spPr>
+        <p:txBody>
+          <a:bodyPr vert="horz" wrap="square" lIns="0" tIns="0" rIns="0" bIns="0" rtlCol="0">
+            <a:spAutoFit/>
+          </a:bodyPr>
+          <a:lstStyle/>
+          <a:p>
+            <a:pPr marL="127635">
+              <a:lnSpc>
+                <a:spcPts val="1435"/>
+              </a:lnSpc>
+            </a:pPr>
+            <a:fld id="{81D60167-4931-47E6-BA6A-407CBD079E47}" type="slidenum">
+              <a:rPr dirty="0"/>
+              <a:t>7</a:t>
+            </a:fld>
+            <a:endParaRPr dirty="0"/>
+          </a:p>
+        </p:txBody>
+      </p:sp>
+      <p:pic>
+        <p:nvPicPr>
+          <p:cNvPr id="7" name="Рисунок 6">
+            <a:extLst>
+              <a:ext uri="{FF2B5EF4-FFF2-40B4-BE49-F238E27FC236}">
+                <a16:creationId xmlns:a16="http://schemas.microsoft.com/office/drawing/2014/main" id="{D9491FA7-DAEE-4C78-43A3-BA32CC83EAA1}"/>
+              </a:ext>
+            </a:extLst>
+          </p:cNvPr>
+          <p:cNvPicPr>
+            <a:picLocks noChangeAspect="1"/>
+          </p:cNvPicPr>
+          <p:nvPr/>
+        </p:nvPicPr>
+        <p:blipFill>
+          <a:blip r:embed="rId2">
+            <a:extLst>
+              <a:ext uri="{28A0092B-C50C-407E-A947-70E740481C1C}">
+                <a14:useLocalDpi xmlns:a14="http://schemas.microsoft.com/office/drawing/2010/main" val="0"/>
+              </a:ext>
+            </a:extLst>
+          </a:blip>
+          <a:stretch>
+            <a:fillRect/>
+          </a:stretch>
+        </p:blipFill>
+        <p:spPr>
+          <a:xfrm>
+            <a:off x="4741026" y="742950"/>
+            <a:ext cx="3810507" cy="3810507"/>
+          </a:xfrm>
+          <a:prstGeom prst="rect">
+            <a:avLst/>
+          </a:prstGeom>
+        </p:spPr>
+      </p:pic>
+      <p:sp>
+        <p:nvSpPr>
+          <p:cNvPr id="8" name="TextBox 7">
+            <a:extLst>
+              <a:ext uri="{FF2B5EF4-FFF2-40B4-BE49-F238E27FC236}">
+                <a16:creationId xmlns:a16="http://schemas.microsoft.com/office/drawing/2014/main" id="{A25CE9E5-ED33-DA97-8AE3-7D020D3CCBF7}"/>
+              </a:ext>
+            </a:extLst>
+          </p:cNvPr>
+          <p:cNvSpPr txBox="1"/>
+          <p:nvPr/>
+        </p:nvSpPr>
+        <p:spPr>
+          <a:xfrm>
+            <a:off x="228600" y="681521"/>
+            <a:ext cx="4953000" cy="4195957"/>
+          </a:xfrm>
+          <a:prstGeom prst="rect">
+            <a:avLst/>
+          </a:prstGeom>
+          <a:noFill/>
+        </p:spPr>
+        <p:txBody>
+          <a:bodyPr wrap="square" rtlCol="0">
+            <a:spAutoFit/>
+          </a:bodyPr>
+          <a:lstStyle/>
+          <a:p>
+            <a:pPr marL="342900" indent="-342900">
+              <a:lnSpc>
+                <a:spcPct val="150000"/>
+              </a:lnSpc>
+              <a:buAutoNum type="arabicPeriod"/>
+            </a:pPr>
+            <a:r>
+              <a:rPr lang="en-US" dirty="0"/>
+              <a:t>Generate a key’s pair</a:t>
+            </a:r>
+          </a:p>
+          <a:p>
+            <a:pPr marL="342900" indent="-342900">
+              <a:lnSpc>
+                <a:spcPct val="150000"/>
+              </a:lnSpc>
+              <a:buAutoNum type="arabicPeriod"/>
+            </a:pPr>
+            <a:r>
+              <a:rPr lang="en-US" dirty="0"/>
+              <a:t>Expand three servers</a:t>
+            </a:r>
+          </a:p>
+          <a:p>
+            <a:pPr marL="342900" indent="-342900">
+              <a:lnSpc>
+                <a:spcPct val="150000"/>
+              </a:lnSpc>
+              <a:buAutoNum type="arabicPeriod"/>
+            </a:pPr>
+            <a:r>
+              <a:rPr lang="en-US" dirty="0"/>
+              <a:t>Put public and private key in certain proper place</a:t>
+            </a:r>
+          </a:p>
+          <a:p>
+            <a:pPr marL="342900" indent="-342900">
+              <a:lnSpc>
+                <a:spcPct val="150000"/>
+              </a:lnSpc>
+              <a:buAutoNum type="arabicPeriod"/>
+            </a:pPr>
+            <a:r>
+              <a:rPr lang="en-US" dirty="0"/>
+              <a:t>Install ansible</a:t>
+            </a:r>
+          </a:p>
+          <a:p>
+            <a:pPr marL="342900" indent="-342900">
+              <a:lnSpc>
+                <a:spcPct val="150000"/>
+              </a:lnSpc>
+              <a:buAutoNum type="arabicPeriod"/>
+            </a:pPr>
+            <a:r>
+              <a:rPr lang="en-US" dirty="0"/>
+              <a:t>Configure ansible</a:t>
+            </a:r>
+          </a:p>
+          <a:p>
+            <a:pPr marL="342900" indent="-342900">
+              <a:lnSpc>
+                <a:spcPct val="150000"/>
+              </a:lnSpc>
+              <a:buAutoNum type="arabicPeriod"/>
+            </a:pPr>
+            <a:r>
+              <a:rPr lang="en-US" dirty="0"/>
+              <a:t>Clone repo from git with playbook</a:t>
+            </a:r>
+          </a:p>
+          <a:p>
+            <a:pPr marL="342900" indent="-342900">
+              <a:lnSpc>
+                <a:spcPct val="150000"/>
+              </a:lnSpc>
+              <a:buAutoNum type="arabicPeriod"/>
+            </a:pPr>
+            <a:r>
+              <a:rPr lang="en-US" dirty="0"/>
+              <a:t>Run playbook</a:t>
+            </a:r>
+          </a:p>
+          <a:p>
+            <a:pPr>
+              <a:lnSpc>
+                <a:spcPct val="150000"/>
+              </a:lnSpc>
+            </a:pPr>
+            <a:r>
+              <a:rPr lang="en-US" dirty="0"/>
+              <a:t>https://</a:t>
+            </a:r>
+            <a:r>
+              <a:rPr lang="en-US" dirty="0" err="1"/>
+              <a:t>github.com</a:t>
+            </a:r>
+            <a:r>
+              <a:rPr lang="en-US" dirty="0"/>
+              <a:t>/</a:t>
+            </a:r>
+            <a:r>
+              <a:rPr lang="en-US" dirty="0" err="1"/>
+              <a:t>ansokoloff</a:t>
+            </a:r>
+            <a:r>
+              <a:rPr lang="en-US" dirty="0"/>
+              <a:t>/infrastructure/blob/main/</a:t>
+            </a:r>
+            <a:r>
+              <a:rPr lang="en-US" dirty="0" err="1"/>
+              <a:t>main.tf</a:t>
+            </a:r>
+            <a:endParaRPr lang="ru-UA" dirty="0"/>
+          </a:p>
+        </p:txBody>
+      </p:sp>
+    </p:spTree>
+  </p:cSld>
+  <p:clrMapOvr>
+    <a:masterClrMapping/>
+  </p:clrMapOvr>
+</p:sld>
+</file>
+
+<file path=ppt/slides/slide8.xml><?xml version="1.0" encoding="utf-8"?>
+<p:sld xmlns:a="http://schemas.openxmlformats.org/drawingml/2006/main" xmlns:r="http://schemas.openxmlformats.org/officeDocument/2006/relationships" xmlns:p="http://schemas.openxmlformats.org/presentationml/2006/main">
+  <p:cSld>
+    <p:spTree>
+      <p:nvGrpSpPr>
+        <p:cNvPr id="1" name=""/>
+        <p:cNvGrpSpPr/>
+        <p:nvPr/>
+      </p:nvGrpSpPr>
+      <p:grpSpPr>
+        <a:xfrm>
+          <a:off x="0" y="0"/>
+          <a:ext cx="0" cy="0"/>
+          <a:chOff x="0" y="0"/>
+          <a:chExt cx="0" cy="0"/>
+        </a:xfrm>
+      </p:grpSpPr>
+      <p:sp>
+        <p:nvSpPr>
+          <p:cNvPr id="2" name="object 2"/>
+          <p:cNvSpPr txBox="1">
+            <a:spLocks noGrp="1"/>
+          </p:cNvSpPr>
+          <p:nvPr>
+            <p:ph type="title"/>
+          </p:nvPr>
+        </p:nvSpPr>
+        <p:spPr>
+          <a:prstGeom prst="rect">
+            <a:avLst/>
+          </a:prstGeom>
+        </p:spPr>
+        <p:txBody>
+          <a:bodyPr vert="horz" wrap="square" lIns="0" tIns="13335" rIns="0" bIns="0" rtlCol="0">
+            <a:spAutoFit/>
+          </a:bodyPr>
+          <a:lstStyle/>
+          <a:p>
+            <a:pPr marL="12700">
+              <a:lnSpc>
+                <a:spcPct val="100000"/>
+              </a:lnSpc>
+              <a:spcBef>
+                <a:spcPts val="105"/>
+              </a:spcBef>
+            </a:pPr>
+            <a:r>
+              <a:rPr lang="en-US" spc="55" dirty="0"/>
+              <a:t>Ansible objectives</a:t>
+            </a:r>
+            <a:endParaRPr spc="55" dirty="0"/>
+          </a:p>
+        </p:txBody>
+      </p:sp>
+      <p:sp>
+        <p:nvSpPr>
+          <p:cNvPr id="5" name="object 5"/>
+          <p:cNvSpPr txBox="1">
+            <a:spLocks noGrp="1"/>
+          </p:cNvSpPr>
+          <p:nvPr>
+            <p:ph type="sldNum" sz="quarter" idx="7"/>
+          </p:nvPr>
+        </p:nvSpPr>
+        <p:spPr>
+          <a:prstGeom prst="rect">
+            <a:avLst/>
+          </a:prstGeom>
+        </p:spPr>
+        <p:txBody>
+          <a:bodyPr vert="horz" wrap="square" lIns="0" tIns="0" rIns="0" bIns="0" rtlCol="0">
+            <a:spAutoFit/>
+          </a:bodyPr>
+          <a:lstStyle/>
+          <a:p>
+            <a:pPr marL="127635">
+              <a:lnSpc>
+                <a:spcPts val="1435"/>
+              </a:lnSpc>
+            </a:pPr>
+            <a:fld id="{81D60167-4931-47E6-BA6A-407CBD079E47}" type="slidenum">
+              <a:rPr dirty="0"/>
+              <a:t>8</a:t>
+            </a:fld>
+            <a:endParaRPr dirty="0"/>
+          </a:p>
+        </p:txBody>
+      </p:sp>
+      <p:sp>
+        <p:nvSpPr>
+          <p:cNvPr id="8" name="TextBox 7">
+            <a:extLst>
+              <a:ext uri="{FF2B5EF4-FFF2-40B4-BE49-F238E27FC236}">
+                <a16:creationId xmlns:a16="http://schemas.microsoft.com/office/drawing/2014/main" id="{A25CE9E5-ED33-DA97-8AE3-7D020D3CCBF7}"/>
+              </a:ext>
+            </a:extLst>
+          </p:cNvPr>
+          <p:cNvSpPr txBox="1"/>
+          <p:nvPr/>
+        </p:nvSpPr>
+        <p:spPr>
+          <a:xfrm>
+            <a:off x="228600" y="681521"/>
+            <a:ext cx="4953000" cy="3780458"/>
+          </a:xfrm>
+          <a:prstGeom prst="rect">
+            <a:avLst/>
+          </a:prstGeom>
+          <a:noFill/>
+        </p:spPr>
+        <p:txBody>
+          <a:bodyPr wrap="square" rtlCol="0">
+            <a:spAutoFit/>
+          </a:bodyPr>
+          <a:lstStyle/>
+          <a:p>
+            <a:pPr marL="342900" indent="-342900">
+              <a:lnSpc>
+                <a:spcPct val="150000"/>
+              </a:lnSpc>
+              <a:buAutoNum type="arabicPeriod"/>
+            </a:pPr>
+            <a:r>
+              <a:rPr lang="en-US" dirty="0"/>
+              <a:t>Install docker</a:t>
+            </a:r>
+          </a:p>
+          <a:p>
+            <a:pPr marL="342900" indent="-342900">
+              <a:lnSpc>
+                <a:spcPct val="150000"/>
+              </a:lnSpc>
+              <a:buAutoNum type="arabicPeriod"/>
+            </a:pPr>
+            <a:r>
+              <a:rPr lang="en-US" dirty="0"/>
+              <a:t>Install common software</a:t>
+            </a:r>
+          </a:p>
+          <a:p>
+            <a:pPr marL="342900" indent="-342900">
+              <a:lnSpc>
+                <a:spcPct val="150000"/>
+              </a:lnSpc>
+              <a:buAutoNum type="arabicPeriod"/>
+            </a:pPr>
+            <a:r>
+              <a:rPr lang="en-US" dirty="0"/>
+              <a:t>Create users for Jenkins nodes</a:t>
+            </a:r>
+          </a:p>
+          <a:p>
+            <a:pPr marL="342900" indent="-342900">
+              <a:lnSpc>
+                <a:spcPct val="150000"/>
+              </a:lnSpc>
+              <a:buAutoNum type="arabicPeriod"/>
+            </a:pPr>
+            <a:r>
+              <a:rPr lang="en-US" dirty="0"/>
+              <a:t>Put public key for Jenkins users</a:t>
+            </a:r>
+          </a:p>
+          <a:p>
+            <a:pPr marL="342900" indent="-342900">
+              <a:lnSpc>
+                <a:spcPct val="150000"/>
+              </a:lnSpc>
+              <a:buAutoNum type="arabicPeriod"/>
+            </a:pPr>
+            <a:r>
+              <a:rPr lang="en-US" dirty="0"/>
+              <a:t>Install k8s</a:t>
+            </a:r>
+          </a:p>
+          <a:p>
+            <a:pPr marL="342900" indent="-342900">
+              <a:lnSpc>
+                <a:spcPct val="150000"/>
+              </a:lnSpc>
+              <a:buAutoNum type="arabicPeriod"/>
+            </a:pPr>
+            <a:r>
+              <a:rPr lang="en-US" dirty="0"/>
+              <a:t>Install </a:t>
+            </a:r>
+            <a:r>
+              <a:rPr lang="en-US" dirty="0" err="1"/>
+              <a:t>kubectl</a:t>
+            </a:r>
+            <a:endParaRPr lang="en-US" dirty="0"/>
+          </a:p>
+          <a:p>
+            <a:pPr marL="342900" indent="-342900">
+              <a:lnSpc>
+                <a:spcPct val="150000"/>
+              </a:lnSpc>
+              <a:buAutoNum type="arabicPeriod"/>
+            </a:pPr>
+            <a:r>
+              <a:rPr lang="en-US" dirty="0"/>
+              <a:t>Install helm</a:t>
+            </a:r>
+          </a:p>
+          <a:p>
+            <a:pPr>
+              <a:lnSpc>
+                <a:spcPct val="150000"/>
+              </a:lnSpc>
+            </a:pPr>
+            <a:r>
+              <a:rPr lang="en-US" dirty="0"/>
+              <a:t>https://</a:t>
+            </a:r>
+            <a:r>
+              <a:rPr lang="en-US" dirty="0" err="1"/>
+              <a:t>github.com</a:t>
+            </a:r>
+            <a:r>
+              <a:rPr lang="en-US" dirty="0"/>
+              <a:t>/</a:t>
+            </a:r>
+            <a:r>
+              <a:rPr lang="en-US" dirty="0" err="1"/>
+              <a:t>ansokoloff</a:t>
+            </a:r>
+            <a:r>
+              <a:rPr lang="en-US" dirty="0"/>
+              <a:t>/infrastructure/blob/main/</a:t>
+            </a:r>
+            <a:r>
+              <a:rPr lang="en-US" dirty="0" err="1"/>
+              <a:t>global.yaml</a:t>
+            </a:r>
+            <a:endParaRPr lang="ru-UA" dirty="0"/>
+          </a:p>
+        </p:txBody>
+      </p:sp>
+      <p:pic>
+        <p:nvPicPr>
+          <p:cNvPr id="4" name="Рисунок 3" descr="Изображение выглядит как спортивная игра&#10;&#10;Автоматически созданное описание">
+            <a:extLst>
+              <a:ext uri="{FF2B5EF4-FFF2-40B4-BE49-F238E27FC236}">
+                <a16:creationId xmlns:a16="http://schemas.microsoft.com/office/drawing/2014/main" id="{FEF1F0E8-A899-8DF1-6BFB-811E202639E4}"/>
+              </a:ext>
+            </a:extLst>
+          </p:cNvPr>
+          <p:cNvPicPr>
+            <a:picLocks noChangeAspect="1"/>
+          </p:cNvPicPr>
+          <p:nvPr/>
+        </p:nvPicPr>
+        <p:blipFill>
+          <a:blip r:embed="rId2">
+            <a:extLst>
+              <a:ext uri="{28A0092B-C50C-407E-A947-70E740481C1C}">
+                <a14:useLocalDpi xmlns:a14="http://schemas.microsoft.com/office/drawing/2010/main" val="0"/>
+              </a:ext>
+            </a:extLst>
+          </a:blip>
+          <a:stretch>
+            <a:fillRect/>
+          </a:stretch>
+        </p:blipFill>
+        <p:spPr>
+          <a:xfrm>
+            <a:off x="5429757" y="971550"/>
+            <a:ext cx="3409950" cy="3409950"/>
+          </a:xfrm>
+          <a:prstGeom prst="rect">
+            <a:avLst/>
+          </a:prstGeom>
+        </p:spPr>
+      </p:pic>
+    </p:spTree>
+    <p:extLst>
+      <p:ext uri="{BB962C8B-B14F-4D97-AF65-F5344CB8AC3E}">
+        <p14:creationId xmlns:p14="http://schemas.microsoft.com/office/powerpoint/2010/main" val="1047565727"/>
       </p:ext>
     </p:extLst>
   </p:cSld>
@@ -6322,7 +6816,7 @@
             </a:pPr>
             <a:r>
               <a:rPr lang="en-US" spc="55" dirty="0"/>
-              <a:t>Maven-based web-application</a:t>
+              <a:t>Conclusion</a:t>
             </a:r>
             <a:endParaRPr spc="55" dirty="0"/>
           </a:p>
@@ -6364,10 +6858,10 @@
       </p:sp>
       <p:pic>
         <p:nvPicPr>
-          <p:cNvPr id="6" name="Рисунок 5" descr="Изображение выглядит как текст&#10;&#10;Автоматически созданное описание">
+          <p:cNvPr id="5" name="Рисунок 4" descr="Изображение выглядит как текст&#10;&#10;Автоматически созданное описание">
             <a:extLst>
               <a:ext uri="{FF2B5EF4-FFF2-40B4-BE49-F238E27FC236}">
-                <a16:creationId xmlns:a16="http://schemas.microsoft.com/office/drawing/2014/main" id="{C7DCE911-7FCD-51A7-C03A-DAB73D96664F}"/>
+                <a16:creationId xmlns:a16="http://schemas.microsoft.com/office/drawing/2014/main" id="{C9A265C6-6A0F-503C-D64D-A59F4D652ABB}"/>
               </a:ext>
             </a:extLst>
           </p:cNvPr>
@@ -6390,20 +6884,87 @@
         </p:blipFill>
         <p:spPr>
           <a:xfrm>
-            <a:off x="508000" y="749300"/>
-            <a:ext cx="8128000" cy="3644900"/>
+            <a:off x="228600" y="1505821"/>
+            <a:ext cx="2892615" cy="2131857"/>
           </a:xfrm>
           <a:prstGeom prst="rect">
             <a:avLst/>
           </a:prstGeom>
         </p:spPr>
       </p:pic>
+      <p:pic>
+        <p:nvPicPr>
+          <p:cNvPr id="7" name="Рисунок 6" descr="Изображение выглядит как часы&#10;&#10;Автоматически созданное описание">
+            <a:extLst>
+              <a:ext uri="{FF2B5EF4-FFF2-40B4-BE49-F238E27FC236}">
+                <a16:creationId xmlns:a16="http://schemas.microsoft.com/office/drawing/2014/main" id="{C93A9A20-A7CA-C8F2-D07D-287F2508EC81}"/>
+              </a:ext>
+            </a:extLst>
+          </p:cNvPr>
+          <p:cNvPicPr>
+            <a:picLocks noChangeAspect="1"/>
+          </p:cNvPicPr>
+          <p:nvPr/>
+        </p:nvPicPr>
+        <p:blipFill>
+          <a:blip r:embed="rId3">
+            <a:extLst>
+              <a:ext uri="{28A0092B-C50C-407E-A947-70E740481C1C}">
+                <a14:useLocalDpi xmlns:a14="http://schemas.microsoft.com/office/drawing/2010/main" val="0"/>
+              </a:ext>
+            </a:extLst>
+          </a:blip>
+          <a:stretch>
+            <a:fillRect/>
+          </a:stretch>
+        </p:blipFill>
+        <p:spPr>
+          <a:xfrm>
+            <a:off x="2946400" y="946150"/>
+            <a:ext cx="3251200" cy="3251200"/>
+          </a:xfrm>
+          <a:prstGeom prst="rect">
+            <a:avLst/>
+          </a:prstGeom>
+        </p:spPr>
+      </p:pic>
+      <p:pic>
+        <p:nvPicPr>
+          <p:cNvPr id="9" name="Рисунок 8">
+            <a:extLst>
+              <a:ext uri="{FF2B5EF4-FFF2-40B4-BE49-F238E27FC236}">
+                <a16:creationId xmlns:a16="http://schemas.microsoft.com/office/drawing/2014/main" id="{66E36CF6-B29E-B575-C14B-8B7916827C6C}"/>
+              </a:ext>
+            </a:extLst>
+          </p:cNvPr>
+          <p:cNvPicPr>
+            <a:picLocks noChangeAspect="1"/>
+          </p:cNvPicPr>
+          <p:nvPr/>
+        </p:nvPicPr>
+        <p:blipFill>
+          <a:blip r:embed="rId4">
+            <a:extLst>
+              <a:ext uri="{28A0092B-C50C-407E-A947-70E740481C1C}">
+                <a14:useLocalDpi xmlns:a14="http://schemas.microsoft.com/office/drawing/2010/main" val="0"/>
+              </a:ext>
+            </a:extLst>
+          </a:blip>
+          <a:stretch>
+            <a:fillRect/>
+          </a:stretch>
+        </p:blipFill>
+        <p:spPr>
+          <a:xfrm>
+            <a:off x="5514966" y="946150"/>
+            <a:ext cx="3629034" cy="3435350"/>
+          </a:xfrm>
+          <a:prstGeom prst="rect">
+            <a:avLst/>
+          </a:prstGeom>
+        </p:spPr>
+      </p:pic>
     </p:spTree>
-    <p:extLst>
-      <p:ext uri="{BB962C8B-B14F-4D97-AF65-F5344CB8AC3E}">
-        <p14:creationId xmlns:p14="http://schemas.microsoft.com/office/powerpoint/2010/main" val="3662531361"/>
-      </p:ext>
-    </p:extLst>
   </p:cSld>
   <p:clrMapOvr>
     <a:masterClrMapping/>

</xml_diff>